<commit_message>
all done. bugs fixed
</commit_message>
<xml_diff>
--- a/Финансовый органайзер.pptx
+++ b/Финансовый органайзер.pptx
@@ -1,63 +1,42 @@
 
 <file path=ppt/presentation.xml><?xml version="1.0" encoding="utf-8"?>
-<p:presentation xmlns:a="http://schemas.openxmlformats.org/drawingml/2006/main" xmlns:r="http://schemas.openxmlformats.org/officeDocument/2006/relationships" xmlns:p="http://schemas.openxmlformats.org/presentationml/2006/main" saveSubsetFonts="1" embedTrueTypeFonts="true">
+<p:presentation xmlns:a="http://schemas.openxmlformats.org/drawingml/2006/main" xmlns:r="http://schemas.openxmlformats.org/officeDocument/2006/relationships" xmlns:p="http://schemas.openxmlformats.org/presentationml/2006/main" embedTrueTypeFonts="1" saveSubsetFonts="1">
   <p:sldMasterIdLst>
     <p:sldMasterId id="2147483648" r:id="rId1"/>
   </p:sldMasterIdLst>
   <p:sldIdLst>
-    <p:sldId id="256" r:id="rId16"/>
-    <p:sldId id="257" r:id="rId17"/>
-    <p:sldId id="258" r:id="rId18"/>
-    <p:sldId id="259" r:id="rId19"/>
-    <p:sldId id="260" r:id="rId20"/>
-    <p:sldId id="261" r:id="rId21"/>
-    <p:sldId id="262" r:id="rId22"/>
-    <p:sldId id="263" r:id="rId23"/>
-    <p:sldId id="264" r:id="rId24"/>
-    <p:sldId id="265" r:id="rId25"/>
+    <p:sldId id="256" r:id="rId2"/>
+    <p:sldId id="257" r:id="rId3"/>
+    <p:sldId id="258" r:id="rId4"/>
+    <p:sldId id="259" r:id="rId5"/>
+    <p:sldId id="260" r:id="rId6"/>
+    <p:sldId id="261" r:id="rId7"/>
+    <p:sldId id="262" r:id="rId8"/>
+    <p:sldId id="263" r:id="rId9"/>
+    <p:sldId id="264" r:id="rId10"/>
+    <p:sldId id="265" r:id="rId11"/>
   </p:sldIdLst>
   <p:sldSz cx="18288000" cy="10287000"/>
   <p:notesSz cx="6858000" cy="9144000"/>
   <p:embeddedFontLst>
     <p:embeddedFont>
-      <p:font typeface="Arimo" charset="1" panose="020B0604020202020204"/>
-      <p:regular r:id="rId6"/>
+      <p:font typeface="Calibri" pitchFamily="34" charset="0"/>
+      <p:regular r:id="rId12"/>
+      <p:bold r:id="rId13"/>
+      <p:italic r:id="rId14"/>
+      <p:boldItalic r:id="rId15"/>
     </p:embeddedFont>
     <p:embeddedFont>
-      <p:font typeface="Arimo Bold" charset="1" panose="020B0704020202020204"/>
-      <p:regular r:id="rId7"/>
+      <p:font typeface="Lato Bold" charset="0"/>
+      <p:regular r:id="rId16"/>
     </p:embeddedFont>
     <p:embeddedFont>
-      <p:font typeface="Arimo Italics" charset="1" panose="020B0604020202090204"/>
-      <p:regular r:id="rId8"/>
+      <p:font typeface="Lato" charset="0"/>
+      <p:regular r:id="rId17"/>
     </p:embeddedFont>
     <p:embeddedFont>
-      <p:font typeface="Arimo Bold Italics" charset="1" panose="020B0704020202090204"/>
-      <p:regular r:id="rId9"/>
-    </p:embeddedFont>
-    <p:embeddedFont>
-      <p:font typeface="Big Shoulders Display" charset="1" panose="00000000000000000000"/>
-      <p:regular r:id="rId10"/>
-    </p:embeddedFont>
-    <p:embeddedFont>
-      <p:font typeface="Big Shoulders Display Bold" charset="1" panose="00000000000000000000"/>
-      <p:regular r:id="rId11"/>
-    </p:embeddedFont>
-    <p:embeddedFont>
-      <p:font typeface="Lato" charset="1" panose="020F0502020204030203"/>
-      <p:regular r:id="rId12"/>
-    </p:embeddedFont>
-    <p:embeddedFont>
-      <p:font typeface="Lato Bold" charset="1" panose="020F0502020204030203"/>
-      <p:regular r:id="rId13"/>
-    </p:embeddedFont>
-    <p:embeddedFont>
-      <p:font typeface="Lato Italics" charset="1" panose="020F0502020204030203"/>
-      <p:regular r:id="rId14"/>
-    </p:embeddedFont>
-    <p:embeddedFont>
-      <p:font typeface="Lato Bold Italics" charset="1" panose="020F0502020204030203"/>
-      <p:regular r:id="rId15"/>
+      <p:font typeface="Big Shoulders Display Bold" charset="0"/>
+      <p:regular r:id="rId18"/>
     </p:embeddedFont>
   </p:embeddedFontLst>
   <p:defaultTextStyle>
@@ -340,7 +319,7 @@
             <a:fld id="{1D8BD707-D9CF-40AE-B4C6-C98DA3205C09}" type="datetimeFigureOut">
               <a:rPr lang="en-US" smtClean="0"/>
               <a:pPr/>
-              <a:t>8/1/2011</a:t>
+              <a:t>11/12/2021</a:t>
             </a:fld>
             <a:endParaRPr lang="en-US"/>
           </a:p>
@@ -507,7 +486,7 @@
             <a:fld id="{1D8BD707-D9CF-40AE-B4C6-C98DA3205C09}" type="datetimeFigureOut">
               <a:rPr lang="en-US" smtClean="0"/>
               <a:pPr/>
-              <a:t>8/1/2011</a:t>
+              <a:t>11/12/2021</a:t>
             </a:fld>
             <a:endParaRPr lang="en-US"/>
           </a:p>
@@ -684,7 +663,7 @@
             <a:fld id="{1D8BD707-D9CF-40AE-B4C6-C98DA3205C09}" type="datetimeFigureOut">
               <a:rPr lang="en-US" smtClean="0"/>
               <a:pPr/>
-              <a:t>8/1/2011</a:t>
+              <a:t>11/12/2021</a:t>
             </a:fld>
             <a:endParaRPr lang="en-US"/>
           </a:p>
@@ -851,7 +830,7 @@
             <a:fld id="{1D8BD707-D9CF-40AE-B4C6-C98DA3205C09}" type="datetimeFigureOut">
               <a:rPr lang="en-US" smtClean="0"/>
               <a:pPr/>
-              <a:t>8/1/2011</a:t>
+              <a:t>11/12/2021</a:t>
             </a:fld>
             <a:endParaRPr lang="en-US"/>
           </a:p>
@@ -1094,7 +1073,7 @@
             <a:fld id="{1D8BD707-D9CF-40AE-B4C6-C98DA3205C09}" type="datetimeFigureOut">
               <a:rPr lang="en-US" smtClean="0"/>
               <a:pPr/>
-              <a:t>8/1/2011</a:t>
+              <a:t>11/12/2021</a:t>
             </a:fld>
             <a:endParaRPr lang="en-US"/>
           </a:p>
@@ -1379,7 +1358,7 @@
             <a:fld id="{1D8BD707-D9CF-40AE-B4C6-C98DA3205C09}" type="datetimeFigureOut">
               <a:rPr lang="en-US" smtClean="0"/>
               <a:pPr/>
-              <a:t>8/1/2011</a:t>
+              <a:t>11/12/2021</a:t>
             </a:fld>
             <a:endParaRPr lang="en-US"/>
           </a:p>
@@ -1798,7 +1777,7 @@
             <a:fld id="{1D8BD707-D9CF-40AE-B4C6-C98DA3205C09}" type="datetimeFigureOut">
               <a:rPr lang="en-US" smtClean="0"/>
               <a:pPr/>
-              <a:t>8/1/2011</a:t>
+              <a:t>11/12/2021</a:t>
             </a:fld>
             <a:endParaRPr lang="en-US"/>
           </a:p>
@@ -1913,7 +1892,7 @@
             <a:fld id="{1D8BD707-D9CF-40AE-B4C6-C98DA3205C09}" type="datetimeFigureOut">
               <a:rPr lang="en-US" smtClean="0"/>
               <a:pPr/>
-              <a:t>8/1/2011</a:t>
+              <a:t>11/12/2021</a:t>
             </a:fld>
             <a:endParaRPr lang="en-US"/>
           </a:p>
@@ -2005,7 +1984,7 @@
             <a:fld id="{1D8BD707-D9CF-40AE-B4C6-C98DA3205C09}" type="datetimeFigureOut">
               <a:rPr lang="en-US" smtClean="0"/>
               <a:pPr/>
-              <a:t>8/1/2011</a:t>
+              <a:t>11/12/2021</a:t>
             </a:fld>
             <a:endParaRPr lang="en-US"/>
           </a:p>
@@ -2279,7 +2258,7 @@
             <a:fld id="{1D8BD707-D9CF-40AE-B4C6-C98DA3205C09}" type="datetimeFigureOut">
               <a:rPr lang="en-US" smtClean="0"/>
               <a:pPr/>
-              <a:t>8/1/2011</a:t>
+              <a:t>11/12/2021</a:t>
             </a:fld>
             <a:endParaRPr lang="en-US"/>
           </a:p>
@@ -2529,7 +2508,7 @@
             <a:fld id="{1D8BD707-D9CF-40AE-B4C6-C98DA3205C09}" type="datetimeFigureOut">
               <a:rPr lang="en-US" smtClean="0"/>
               <a:pPr/>
-              <a:t>8/1/2011</a:t>
+              <a:t>11/12/2021</a:t>
             </a:fld>
             <a:endParaRPr lang="en-US"/>
           </a:p>
@@ -2739,7 +2718,7 @@
             <a:fld id="{1D8BD707-D9CF-40AE-B4C6-C98DA3205C09}" type="datetimeFigureOut">
               <a:rPr lang="en-US" smtClean="0"/>
               <a:pPr/>
-              <a:t>8/1/2011</a:t>
+              <a:t>11/12/2021</a:t>
             </a:fld>
             <a:endParaRPr lang="en-US"/>
           </a:p>
@@ -3094,13 +3073,14 @@
 </file>
 
 <file path=ppt/slides/slide1.xml><?xml version="1.0" encoding="utf-8"?>
-<p:sld xmlns:p="http://schemas.openxmlformats.org/presentationml/2006/main" xmlns:a="http://schemas.openxmlformats.org/drawingml/2006/main" xmlns:r="http://schemas.openxmlformats.org/officeDocument/2006/relationships">
+<p:sld xmlns:a="http://schemas.openxmlformats.org/drawingml/2006/main" xmlns:r="http://schemas.openxmlformats.org/officeDocument/2006/relationships" xmlns:p="http://schemas.openxmlformats.org/presentationml/2006/main">
   <p:cSld>
     <p:bg>
       <p:bgPr>
         <a:solidFill>
           <a:srgbClr val="1B1939"/>
         </a:solidFill>
+        <a:effectLst/>
       </p:bgPr>
     </p:bg>
     <p:spTree>
@@ -3119,12 +3099,12 @@
       </p:grpSpPr>
       <p:sp>
         <p:nvSpPr>
-          <p:cNvPr name="AutoShape 2" id="2"/>
+          <p:cNvPr id="2" name="AutoShape 2"/>
           <p:cNvSpPr/>
           <p:nvPr/>
         </p:nvSpPr>
         <p:spPr>
-          <a:xfrm rot="0">
+          <a:xfrm>
             <a:off x="15721248" y="-108411"/>
             <a:ext cx="9525" cy="10503822"/>
           </a:xfrm>
@@ -3138,12 +3118,12 @@
       </p:sp>
       <p:grpSp>
         <p:nvGrpSpPr>
-          <p:cNvPr name="Group 3" id="3"/>
+          <p:cNvPr id="3" name="Group 3"/>
           <p:cNvGrpSpPr/>
           <p:nvPr/>
         </p:nvGrpSpPr>
         <p:grpSpPr>
-          <a:xfrm rot="0">
+          <a:xfrm>
             <a:off x="7140390" y="1028700"/>
             <a:ext cx="7388109" cy="7388109"/>
             <a:chOff x="0" y="0"/>
@@ -3152,9 +3132,9 @@
         </p:grpSpPr>
         <p:pic>
           <p:nvPicPr>
-            <p:cNvPr name="Picture 4" id="4"/>
+            <p:cNvPr id="4" name="Picture 4"/>
             <p:cNvPicPr>
-              <a:picLocks noChangeAspect="true"/>
+              <a:picLocks noChangeAspect="1"/>
             </p:cNvPicPr>
             <p:nvPr/>
           </p:nvPicPr>
@@ -3165,17 +3145,17 @@
                   <a14:useLocalDpi xmlns:a14="http://schemas.microsoft.com/office/drawing/2010/main" val="0"/>
                 </a:ext>
                 <a:ext uri="{96DAC541-7B7A-43D3-8B79-37D633B846F1}">
-                  <asvg:svgBlip xmlns:asvg="http://schemas.microsoft.com/office/drawing/2016/SVG/main" r:embed="rId3"/>
+                  <asvg:svgBlip xmlns:asvg="http://schemas.microsoft.com/office/drawing/2016/SVG/main" xmlns="" r:embed="rId3"/>
                 </a:ext>
               </a:extLst>
             </a:blip>
-            <a:srcRect l="0" t="0" r="0" b="0"/>
+            <a:srcRect/>
             <a:stretch>
               <a:fillRect/>
             </a:stretch>
           </p:blipFill>
           <p:spPr>
-            <a:xfrm flipH="false" flipV="false" rot="-5400000">
+            <a:xfrm rot="-5400000">
               <a:off x="0" y="0"/>
               <a:ext cx="9850812" cy="9850812"/>
             </a:xfrm>
@@ -3186,9 +3166,9 @@
         </p:pic>
         <p:pic>
           <p:nvPicPr>
-            <p:cNvPr name="Picture 5" id="5"/>
+            <p:cNvPr id="5" name="Picture 5"/>
             <p:cNvPicPr>
-              <a:picLocks noChangeAspect="true"/>
+              <a:picLocks noChangeAspect="1"/>
             </p:cNvPicPr>
             <p:nvPr/>
           </p:nvPicPr>
@@ -3199,17 +3179,17 @@
                   <a14:useLocalDpi xmlns:a14="http://schemas.microsoft.com/office/drawing/2010/main" val="0"/>
                 </a:ext>
                 <a:ext uri="{96DAC541-7B7A-43D3-8B79-37D633B846F1}">
-                  <asvg:svgBlip xmlns:asvg="http://schemas.microsoft.com/office/drawing/2016/SVG/main" r:embed="rId5"/>
+                  <asvg:svgBlip xmlns:asvg="http://schemas.microsoft.com/office/drawing/2016/SVG/main" xmlns="" r:embed="rId5"/>
                 </a:ext>
               </a:extLst>
             </a:blip>
-            <a:srcRect l="0" t="0" r="0" b="0"/>
+            <a:srcRect/>
             <a:stretch>
               <a:fillRect/>
             </a:stretch>
           </p:blipFill>
           <p:spPr>
-            <a:xfrm flipH="false" flipV="false" rot="0">
+            <a:xfrm>
               <a:off x="41142" y="41142"/>
               <a:ext cx="9768527" cy="9768527"/>
             </a:xfrm>
@@ -3219,82 +3199,14 @@
           </p:spPr>
         </p:pic>
       </p:grpSp>
-      <p:pic>
-        <p:nvPicPr>
-          <p:cNvPr name="Picture 6" id="6"/>
-          <p:cNvPicPr>
-            <a:picLocks noChangeAspect="true"/>
-          </p:cNvPicPr>
-          <p:nvPr/>
-        </p:nvPicPr>
-        <p:blipFill>
-          <a:blip r:embed="rId6">
-            <a:extLst>
-              <a:ext uri="{28A0092B-C50C-407E-A947-70E740481C1C}">
-                <a14:useLocalDpi xmlns:a14="http://schemas.microsoft.com/office/drawing/2010/main" val="0"/>
-              </a:ext>
-              <a:ext uri="{96DAC541-7B7A-43D3-8B79-37D633B846F1}">
-                <asvg:svgBlip xmlns:asvg="http://schemas.microsoft.com/office/drawing/2016/SVG/main" r:embed="rId7"/>
-              </a:ext>
-            </a:extLst>
-          </a:blip>
-          <a:srcRect l="0" t="0" r="0" b="0"/>
-          <a:stretch>
-            <a:fillRect/>
-          </a:stretch>
-        </p:blipFill>
-        <p:spPr>
-          <a:xfrm flipH="false" flipV="false" rot="0">
-            <a:off x="14528499" y="7809616"/>
-            <a:ext cx="854503" cy="794688"/>
-          </a:xfrm>
-          <a:prstGeom prst="rect">
-            <a:avLst/>
-          </a:prstGeom>
-        </p:spPr>
-      </p:pic>
-      <p:pic>
-        <p:nvPicPr>
-          <p:cNvPr name="Picture 7" id="7"/>
-          <p:cNvPicPr>
-            <a:picLocks noChangeAspect="true"/>
-          </p:cNvPicPr>
-          <p:nvPr/>
-        </p:nvPicPr>
-        <p:blipFill>
-          <a:blip r:embed="rId8">
-            <a:extLst>
-              <a:ext uri="{28A0092B-C50C-407E-A947-70E740481C1C}">
-                <a14:useLocalDpi xmlns:a14="http://schemas.microsoft.com/office/drawing/2010/main" val="0"/>
-              </a:ext>
-              <a:ext uri="{96DAC541-7B7A-43D3-8B79-37D633B846F1}">
-                <asvg:svgBlip xmlns:asvg="http://schemas.microsoft.com/office/drawing/2016/SVG/main" r:embed="rId9"/>
-              </a:ext>
-            </a:extLst>
-          </a:blip>
-          <a:srcRect l="0" t="0" r="0" b="0"/>
-          <a:stretch>
-            <a:fillRect/>
-          </a:stretch>
-        </p:blipFill>
-        <p:spPr>
-          <a:xfrm flipH="false" flipV="false" rot="0">
-            <a:off x="981075" y="1028700"/>
-            <a:ext cx="453254" cy="453254"/>
-          </a:xfrm>
-          <a:prstGeom prst="rect">
-            <a:avLst/>
-          </a:prstGeom>
-        </p:spPr>
-      </p:pic>
-      <p:sp>
-        <p:nvSpPr>
-          <p:cNvPr name="AutoShape 8" id="8"/>
+      <p:sp>
+        <p:nvSpPr>
+          <p:cNvPr id="6" name="AutoShape 6"/>
           <p:cNvSpPr/>
           <p:nvPr/>
         </p:nvSpPr>
         <p:spPr>
-          <a:xfrm rot="0">
+          <a:xfrm>
             <a:off x="-2566752" y="9077325"/>
             <a:ext cx="18288000" cy="9525"/>
           </a:xfrm>
@@ -3308,12 +3220,12 @@
       </p:sp>
       <p:grpSp>
         <p:nvGrpSpPr>
-          <p:cNvPr name="Group 9" id="9"/>
+          <p:cNvPr id="7" name="Group 7"/>
           <p:cNvGrpSpPr/>
           <p:nvPr/>
         </p:nvGrpSpPr>
         <p:grpSpPr>
-          <a:xfrm rot="0">
+          <a:xfrm>
             <a:off x="1028700" y="2735680"/>
             <a:ext cx="11013625" cy="4815640"/>
             <a:chOff x="0" y="0"/>
@@ -3322,12 +3234,12 @@
         </p:grpSpPr>
         <p:sp>
           <p:nvSpPr>
-            <p:cNvPr name="TextBox 10" id="10"/>
-            <p:cNvSpPr txBox="true"/>
+            <p:cNvPr id="8" name="TextBox 8"/>
+            <p:cNvSpPr txBox="1"/>
             <p:nvPr/>
           </p:nvSpPr>
           <p:spPr>
-            <a:xfrm rot="0">
+            <a:xfrm>
               <a:off x="0" y="464803"/>
               <a:ext cx="14684833" cy="4159194"/>
             </a:xfrm>
@@ -3336,7 +3248,7 @@
             </a:prstGeom>
           </p:spPr>
           <p:txBody>
-            <a:bodyPr anchor="t" rtlCol="false" tIns="0" lIns="0" bIns="0" rIns="0">
+            <a:bodyPr lIns="0" tIns="0" rIns="0" bIns="0" rtlCol="0" anchor="t">
               <a:spAutoFit/>
             </a:bodyPr>
             <a:lstStyle/>
@@ -3360,12 +3272,12 @@
         </p:sp>
         <p:sp>
           <p:nvSpPr>
-            <p:cNvPr name="TextBox 11" id="11"/>
-            <p:cNvSpPr txBox="true"/>
+            <p:cNvPr id="9" name="TextBox 9"/>
+            <p:cNvSpPr txBox="1"/>
             <p:nvPr/>
           </p:nvSpPr>
           <p:spPr>
-            <a:xfrm rot="0">
+            <a:xfrm>
               <a:off x="0" y="5341988"/>
               <a:ext cx="14684833" cy="1083945"/>
             </a:xfrm>
@@ -3374,7 +3286,7 @@
             </a:prstGeom>
           </p:spPr>
           <p:txBody>
-            <a:bodyPr anchor="t" rtlCol="false" tIns="0" lIns="0" bIns="0" rIns="0">
+            <a:bodyPr lIns="0" tIns="0" rIns="0" bIns="0" rtlCol="0" anchor="t">
               <a:spAutoFit/>
             </a:bodyPr>
             <a:lstStyle/>
@@ -3413,132 +3325,30 @@
           </p:txBody>
         </p:sp>
       </p:grpSp>
-      <p:pic>
-        <p:nvPicPr>
-          <p:cNvPr name="Picture 12" id="12"/>
-          <p:cNvPicPr>
-            <a:picLocks noChangeAspect="true"/>
-          </p:cNvPicPr>
-          <p:nvPr/>
-        </p:nvPicPr>
-        <p:blipFill>
-          <a:blip r:embed="rId10">
-            <a:extLst>
-              <a:ext uri="{28A0092B-C50C-407E-A947-70E740481C1C}">
-                <a14:useLocalDpi xmlns:a14="http://schemas.microsoft.com/office/drawing/2010/main" val="0"/>
-              </a:ext>
-              <a:ext uri="{96DAC541-7B7A-43D3-8B79-37D633B846F1}">
-                <asvg:svgBlip xmlns:asvg="http://schemas.microsoft.com/office/drawing/2016/SVG/main" r:embed="rId11"/>
-              </a:ext>
-            </a:extLst>
-          </a:blip>
-          <a:srcRect l="0" t="0" r="0" b="0"/>
-          <a:stretch>
-            <a:fillRect/>
-          </a:stretch>
-        </p:blipFill>
-        <p:spPr>
-          <a:xfrm flipH="false" flipV="false" rot="0">
-            <a:off x="1028700" y="9539656"/>
-            <a:ext cx="431173" cy="190500"/>
-          </a:xfrm>
-          <a:prstGeom prst="rect">
-            <a:avLst/>
-          </a:prstGeom>
-        </p:spPr>
-      </p:pic>
-      <p:sp>
-        <p:nvSpPr>
-          <p:cNvPr name="TextBox 13" id="13"/>
-          <p:cNvSpPr txBox="true"/>
-          <p:nvPr/>
-        </p:nvSpPr>
-        <p:spPr>
-          <a:xfrm rot="0">
-            <a:off x="16439110" y="1195809"/>
-            <a:ext cx="1124259" cy="805664"/>
-          </a:xfrm>
-          <a:prstGeom prst="rect">
-            <a:avLst/>
-          </a:prstGeom>
-        </p:spPr>
-        <p:txBody>
-          <a:bodyPr anchor="t" rtlCol="false" tIns="0" lIns="0" bIns="0" rIns="0">
-            <a:spAutoFit/>
-          </a:bodyPr>
-          <a:lstStyle/>
-          <a:p>
-            <a:pPr algn="ctr">
-              <a:lnSpc>
-                <a:spcPts val="6160"/>
-              </a:lnSpc>
-            </a:pPr>
-            <a:r>
-              <a:rPr lang="en-US" sz="5600">
-                <a:solidFill>
-                  <a:srgbClr val="FFFFFF"/>
-                </a:solidFill>
-                <a:latin typeface="Big Shoulders Display"/>
-              </a:rPr>
-              <a:t>001</a:t>
-            </a:r>
-          </a:p>
-        </p:txBody>
-      </p:sp>
-      <p:sp>
-        <p:nvSpPr>
-          <p:cNvPr name="TextBox 14" id="14"/>
-          <p:cNvSpPr txBox="true"/>
-          <p:nvPr/>
-        </p:nvSpPr>
-        <p:spPr>
-          <a:xfrm rot="5400000">
-            <a:off x="14435649" y="6550681"/>
-            <a:ext cx="5163779" cy="251460"/>
-          </a:xfrm>
-          <a:prstGeom prst="rect">
-            <a:avLst/>
-          </a:prstGeom>
-        </p:spPr>
-        <p:txBody>
-          <a:bodyPr anchor="t" rtlCol="false" tIns="0" lIns="0" bIns="0" rIns="0">
-            <a:spAutoFit/>
-          </a:bodyPr>
-          <a:lstStyle/>
-          <a:p>
-            <a:pPr algn="r">
-              <a:lnSpc>
-                <a:spcPts val="1959"/>
-              </a:lnSpc>
-            </a:pPr>
-            <a:r>
-              <a:rPr lang="en-US" sz="1400" spc="49">
-                <a:solidFill>
-                  <a:srgbClr val="FFFFFF"/>
-                </a:solidFill>
-                <a:latin typeface="Lato"/>
-              </a:rPr>
-              <a:t>УРОК ОБЩЕСТВОЗНАНИЯ | СШ №7</a:t>
-            </a:r>
-          </a:p>
-        </p:txBody>
-      </p:sp>
     </p:spTree>
   </p:cSld>
   <p:clrMapOvr>
     <a:masterClrMapping/>
   </p:clrMapOvr>
+  <p:timing>
+    <p:tnLst>
+      <p:par>
+        <p:cTn id="1" dur="indefinite" restart="never" nodeType="tmRoot"/>
+      </p:par>
+    </p:tnLst>
+  </p:timing>
 </p:sld>
 </file>
 
 <file path=ppt/slides/slide10.xml><?xml version="1.0" encoding="utf-8"?>
-<p:sld xmlns:p="http://schemas.openxmlformats.org/presentationml/2006/main" xmlns:a="http://schemas.openxmlformats.org/drawingml/2006/main" xmlns:r="http://schemas.openxmlformats.org/officeDocument/2006/relationships">
+<p:sld xmlns:a="http://schemas.openxmlformats.org/drawingml/2006/main" xmlns:r="http://schemas.openxmlformats.org/officeDocument/2006/relationships" xmlns:p="http://schemas.openxmlformats.org/presentationml/2006/main">
   <p:cSld>
     <p:bg>
       <p:bgPr>
         <a:solidFill>
           <a:srgbClr val="1B1939"/>
         </a:solidFill>
+        <a:effectLst/>
       </p:bgPr>
     </p:bg>
     <p:spTree>
@@ -3557,9 +3367,9 @@
       </p:grpSpPr>
       <p:pic>
         <p:nvPicPr>
-          <p:cNvPr name="Picture 2" id="2"/>
+          <p:cNvPr id="2" name="Picture 2"/>
           <p:cNvPicPr>
-            <a:picLocks noChangeAspect="true"/>
+            <a:picLocks noChangeAspect="1"/>
           </p:cNvPicPr>
           <p:nvPr/>
         </p:nvPicPr>
@@ -3570,17 +3380,17 @@
                 <a14:useLocalDpi xmlns:a14="http://schemas.microsoft.com/office/drawing/2010/main" val="0"/>
               </a:ext>
               <a:ext uri="{96DAC541-7B7A-43D3-8B79-37D633B846F1}">
-                <asvg:svgBlip xmlns:asvg="http://schemas.microsoft.com/office/drawing/2016/SVG/main" r:embed="rId3"/>
+                <asvg:svgBlip xmlns:asvg="http://schemas.microsoft.com/office/drawing/2016/SVG/main" xmlns="" r:embed="rId3"/>
               </a:ext>
             </a:extLst>
           </a:blip>
-          <a:srcRect l="0" t="0" r="0" b="0"/>
+          <a:srcRect/>
           <a:stretch>
             <a:fillRect/>
           </a:stretch>
         </p:blipFill>
         <p:spPr>
-          <a:xfrm flipH="false" flipV="false" rot="0">
+          <a:xfrm>
             <a:off x="9144000" y="1028700"/>
             <a:ext cx="2244417" cy="2244417"/>
           </a:xfrm>
@@ -3591,9 +3401,9 @@
       </p:pic>
       <p:pic>
         <p:nvPicPr>
-          <p:cNvPr name="Picture 3" id="3"/>
+          <p:cNvPr id="3" name="Picture 3"/>
           <p:cNvPicPr>
-            <a:picLocks noChangeAspect="true"/>
+            <a:picLocks noChangeAspect="1"/>
           </p:cNvPicPr>
           <p:nvPr/>
         </p:nvPicPr>
@@ -3604,17 +3414,17 @@
                 <a14:useLocalDpi xmlns:a14="http://schemas.microsoft.com/office/drawing/2010/main" val="0"/>
               </a:ext>
               <a:ext uri="{96DAC541-7B7A-43D3-8B79-37D633B846F1}">
-                <asvg:svgBlip xmlns:asvg="http://schemas.microsoft.com/office/drawing/2016/SVG/main" r:embed="rId5"/>
+                <asvg:svgBlip xmlns:asvg="http://schemas.microsoft.com/office/drawing/2016/SVG/main" xmlns="" r:embed="rId5"/>
               </a:ext>
             </a:extLst>
           </a:blip>
-          <a:srcRect l="0" t="0" r="0" b="0"/>
+          <a:srcRect/>
           <a:stretch>
             <a:fillRect/>
           </a:stretch>
         </p:blipFill>
         <p:spPr>
-          <a:xfrm flipH="false" flipV="false" rot="0">
+          <a:xfrm>
             <a:off x="11983683" y="1028700"/>
             <a:ext cx="2244417" cy="2244417"/>
           </a:xfrm>
@@ -3625,9 +3435,9 @@
       </p:pic>
       <p:pic>
         <p:nvPicPr>
-          <p:cNvPr name="Picture 4" id="4"/>
+          <p:cNvPr id="4" name="Picture 4"/>
           <p:cNvPicPr>
-            <a:picLocks noChangeAspect="true"/>
+            <a:picLocks noChangeAspect="1"/>
           </p:cNvPicPr>
           <p:nvPr/>
         </p:nvPicPr>
@@ -3638,17 +3448,17 @@
                 <a14:useLocalDpi xmlns:a14="http://schemas.microsoft.com/office/drawing/2010/main" val="0"/>
               </a:ext>
               <a:ext uri="{96DAC541-7B7A-43D3-8B79-37D633B846F1}">
-                <asvg:svgBlip xmlns:asvg="http://schemas.microsoft.com/office/drawing/2016/SVG/main" r:embed="rId7"/>
+                <asvg:svgBlip xmlns:asvg="http://schemas.microsoft.com/office/drawing/2016/SVG/main" xmlns="" r:embed="rId7"/>
               </a:ext>
             </a:extLst>
           </a:blip>
-          <a:srcRect l="0" t="0" r="0" b="0"/>
+          <a:srcRect/>
           <a:stretch>
             <a:fillRect/>
           </a:stretch>
         </p:blipFill>
         <p:spPr>
-          <a:xfrm flipH="false" flipV="false" rot="-10800000">
+          <a:xfrm rot="-10800000">
             <a:off x="14823366" y="1028700"/>
             <a:ext cx="2244417" cy="2244417"/>
           </a:xfrm>
@@ -3659,9 +3469,9 @@
       </p:pic>
       <p:pic>
         <p:nvPicPr>
-          <p:cNvPr name="Picture 5" id="5"/>
+          <p:cNvPr id="5" name="Picture 5"/>
           <p:cNvPicPr>
-            <a:picLocks noChangeAspect="true"/>
+            <a:picLocks noChangeAspect="1"/>
           </p:cNvPicPr>
           <p:nvPr/>
         </p:nvPicPr>
@@ -3672,17 +3482,17 @@
                 <a14:useLocalDpi xmlns:a14="http://schemas.microsoft.com/office/drawing/2010/main" val="0"/>
               </a:ext>
               <a:ext uri="{96DAC541-7B7A-43D3-8B79-37D633B846F1}">
-                <asvg:svgBlip xmlns:asvg="http://schemas.microsoft.com/office/drawing/2016/SVG/main" r:embed="rId9"/>
+                <asvg:svgBlip xmlns:asvg="http://schemas.microsoft.com/office/drawing/2016/SVG/main" xmlns="" r:embed="rId9"/>
               </a:ext>
             </a:extLst>
           </a:blip>
-          <a:srcRect l="0" t="0" r="0" b="0"/>
+          <a:srcRect/>
           <a:stretch>
             <a:fillRect/>
           </a:stretch>
         </p:blipFill>
         <p:spPr>
-          <a:xfrm flipH="false" flipV="false" rot="0">
+          <a:xfrm>
             <a:off x="9317196" y="4045988"/>
             <a:ext cx="1898024" cy="1793633"/>
           </a:xfrm>
@@ -3693,9 +3503,9 @@
       </p:pic>
       <p:pic>
         <p:nvPicPr>
-          <p:cNvPr name="Picture 6" id="6"/>
+          <p:cNvPr id="6" name="Picture 6"/>
           <p:cNvPicPr>
-            <a:picLocks noChangeAspect="true"/>
+            <a:picLocks noChangeAspect="1"/>
           </p:cNvPicPr>
           <p:nvPr/>
         </p:nvPicPr>
@@ -3706,17 +3516,17 @@
                 <a14:useLocalDpi xmlns:a14="http://schemas.microsoft.com/office/drawing/2010/main" val="0"/>
               </a:ext>
               <a:ext uri="{96DAC541-7B7A-43D3-8B79-37D633B846F1}">
-                <asvg:svgBlip xmlns:asvg="http://schemas.microsoft.com/office/drawing/2016/SVG/main" r:embed="rId11"/>
+                <asvg:svgBlip xmlns:asvg="http://schemas.microsoft.com/office/drawing/2016/SVG/main" xmlns="" r:embed="rId11"/>
               </a:ext>
             </a:extLst>
           </a:blip>
-          <a:srcRect l="0" t="0" r="0" b="0"/>
+          <a:srcRect/>
           <a:stretch>
             <a:fillRect/>
           </a:stretch>
         </p:blipFill>
         <p:spPr>
-          <a:xfrm flipH="false" flipV="false" rot="0">
+          <a:xfrm>
             <a:off x="12152784" y="4045988"/>
             <a:ext cx="1888035" cy="1793633"/>
           </a:xfrm>
@@ -3727,9 +3537,9 @@
       </p:pic>
       <p:pic>
         <p:nvPicPr>
-          <p:cNvPr name="Picture 7" id="7"/>
+          <p:cNvPr id="7" name="Picture 7"/>
           <p:cNvPicPr>
-            <a:picLocks noChangeAspect="true"/>
+            <a:picLocks noChangeAspect="1"/>
           </p:cNvPicPr>
           <p:nvPr/>
         </p:nvPicPr>
@@ -3740,17 +3550,17 @@
                 <a14:useLocalDpi xmlns:a14="http://schemas.microsoft.com/office/drawing/2010/main" val="0"/>
               </a:ext>
               <a:ext uri="{96DAC541-7B7A-43D3-8B79-37D633B846F1}">
-                <asvg:svgBlip xmlns:asvg="http://schemas.microsoft.com/office/drawing/2016/SVG/main" r:embed="rId13"/>
+                <asvg:svgBlip xmlns:asvg="http://schemas.microsoft.com/office/drawing/2016/SVG/main" xmlns="" r:embed="rId13"/>
               </a:ext>
             </a:extLst>
           </a:blip>
-          <a:srcRect l="0" t="0" r="0" b="0"/>
+          <a:srcRect/>
           <a:stretch>
             <a:fillRect/>
           </a:stretch>
         </p:blipFill>
         <p:spPr>
-          <a:xfrm flipH="false" flipV="false" rot="0">
+          <a:xfrm>
             <a:off x="14863031" y="4043314"/>
             <a:ext cx="1934387" cy="1798980"/>
           </a:xfrm>
@@ -3761,9 +3571,9 @@
       </p:pic>
       <p:pic>
         <p:nvPicPr>
-          <p:cNvPr name="Picture 8" id="8"/>
+          <p:cNvPr id="8" name="Picture 8"/>
           <p:cNvPicPr>
-            <a:picLocks noChangeAspect="true"/>
+            <a:picLocks noChangeAspect="1"/>
           </p:cNvPicPr>
           <p:nvPr/>
         </p:nvPicPr>
@@ -3774,17 +3584,17 @@
                 <a14:useLocalDpi xmlns:a14="http://schemas.microsoft.com/office/drawing/2010/main" val="0"/>
               </a:ext>
               <a:ext uri="{96DAC541-7B7A-43D3-8B79-37D633B846F1}">
-                <asvg:svgBlip xmlns:asvg="http://schemas.microsoft.com/office/drawing/2016/SVG/main" r:embed="rId15"/>
+                <asvg:svgBlip xmlns:asvg="http://schemas.microsoft.com/office/drawing/2016/SVG/main" xmlns="" r:embed="rId15"/>
               </a:ext>
             </a:extLst>
           </a:blip>
-          <a:srcRect l="0" t="0" r="0" b="0"/>
+          <a:srcRect/>
           <a:stretch>
             <a:fillRect/>
           </a:stretch>
         </p:blipFill>
         <p:spPr>
-          <a:xfrm flipH="false" flipV="false" rot="0">
+          <a:xfrm>
             <a:off x="9184035" y="6894448"/>
             <a:ext cx="2164348" cy="2175224"/>
           </a:xfrm>
@@ -3795,30 +3605,30 @@
       </p:pic>
       <p:pic>
         <p:nvPicPr>
-          <p:cNvPr name="Picture 9" id="9"/>
+          <p:cNvPr id="9" name="Picture 9"/>
           <p:cNvPicPr>
-            <a:picLocks noChangeAspect="true"/>
+            <a:picLocks noChangeAspect="1"/>
           </p:cNvPicPr>
           <p:nvPr/>
         </p:nvPicPr>
         <p:blipFill>
-          <a:blip r:embed="rId16">
+          <a:blip r:embed="rId16" cstate="print">
             <a:extLst>
               <a:ext uri="{28A0092B-C50C-407E-A947-70E740481C1C}">
                 <a14:useLocalDpi xmlns:a14="http://schemas.microsoft.com/office/drawing/2010/main" val="0"/>
               </a:ext>
               <a:ext uri="{96DAC541-7B7A-43D3-8B79-37D633B846F1}">
-                <asvg:svgBlip xmlns:asvg="http://schemas.microsoft.com/office/drawing/2016/SVG/main" r:embed="rId17"/>
+                <asvg:svgBlip xmlns:asvg="http://schemas.microsoft.com/office/drawing/2016/SVG/main" xmlns="" r:embed="rId17"/>
               </a:ext>
             </a:extLst>
           </a:blip>
-          <a:srcRect l="0" t="0" r="0" b="0"/>
+          <a:srcRect/>
           <a:stretch>
             <a:fillRect/>
           </a:stretch>
         </p:blipFill>
         <p:spPr>
-          <a:xfrm flipH="false" flipV="false" rot="0">
+          <a:xfrm>
             <a:off x="14863031" y="6899516"/>
             <a:ext cx="2165088" cy="2165088"/>
           </a:xfrm>
@@ -3829,12 +3639,12 @@
       </p:pic>
       <p:sp>
         <p:nvSpPr>
-          <p:cNvPr name="AutoShape 10" id="10"/>
+          <p:cNvPr id="10" name="AutoShape 10"/>
           <p:cNvSpPr/>
           <p:nvPr/>
         </p:nvSpPr>
         <p:spPr>
-          <a:xfrm rot="0">
+          <a:xfrm>
             <a:off x="8042806" y="-108411"/>
             <a:ext cx="9525" cy="10503822"/>
           </a:xfrm>
@@ -3848,12 +3658,12 @@
       </p:sp>
       <p:sp>
         <p:nvSpPr>
-          <p:cNvPr name="TextBox 11" id="11"/>
-          <p:cNvSpPr txBox="true"/>
+          <p:cNvPr id="11" name="TextBox 11"/>
+          <p:cNvSpPr txBox="1"/>
           <p:nvPr/>
         </p:nvSpPr>
         <p:spPr>
-          <a:xfrm rot="0">
+          <a:xfrm>
             <a:off x="1028700" y="4016803"/>
             <a:ext cx="6249479" cy="1557338"/>
           </a:xfrm>
@@ -3862,7 +3672,7 @@
           </a:prstGeom>
         </p:spPr>
         <p:txBody>
-          <a:bodyPr anchor="t" rtlCol="false" tIns="0" lIns="0" bIns="0" rIns="0">
+          <a:bodyPr lIns="0" tIns="0" rIns="0" bIns="0" rtlCol="0" anchor="t">
             <a:spAutoFit/>
           </a:bodyPr>
           <a:lstStyle/>
@@ -3886,9 +3696,9 @@
       </p:sp>
       <p:pic>
         <p:nvPicPr>
-          <p:cNvPr name="Picture 12" id="12"/>
+          <p:cNvPr id="12" name="Picture 12"/>
           <p:cNvPicPr>
-            <a:picLocks noChangeAspect="true"/>
+            <a:picLocks noChangeAspect="1"/>
           </p:cNvPicPr>
           <p:nvPr/>
         </p:nvPicPr>
@@ -3899,17 +3709,17 @@
                 <a14:useLocalDpi xmlns:a14="http://schemas.microsoft.com/office/drawing/2010/main" val="0"/>
               </a:ext>
               <a:ext uri="{96DAC541-7B7A-43D3-8B79-37D633B846F1}">
-                <asvg:svgBlip xmlns:asvg="http://schemas.microsoft.com/office/drawing/2016/SVG/main" r:embed="rId19"/>
+                <asvg:svgBlip xmlns:asvg="http://schemas.microsoft.com/office/drawing/2016/SVG/main" xmlns="" r:embed="rId19"/>
               </a:ext>
             </a:extLst>
           </a:blip>
-          <a:srcRect l="0" t="0" r="0" b="0"/>
+          <a:srcRect/>
           <a:stretch>
             <a:fillRect/>
           </a:stretch>
         </p:blipFill>
         <p:spPr>
-          <a:xfrm flipH="false" flipV="false" rot="0">
+          <a:xfrm>
             <a:off x="12158623" y="6947322"/>
             <a:ext cx="2069477" cy="2069477"/>
           </a:xfrm>
@@ -3923,17 +3733,25 @@
   <p:clrMapOvr>
     <a:masterClrMapping/>
   </p:clrMapOvr>
+  <p:timing>
+    <p:tnLst>
+      <p:par>
+        <p:cTn id="1" dur="indefinite" restart="never" nodeType="tmRoot"/>
+      </p:par>
+    </p:tnLst>
+  </p:timing>
 </p:sld>
 </file>
 
 <file path=ppt/slides/slide2.xml><?xml version="1.0" encoding="utf-8"?>
-<p:sld xmlns:p="http://schemas.openxmlformats.org/presentationml/2006/main" xmlns:a="http://schemas.openxmlformats.org/drawingml/2006/main" xmlns:r="http://schemas.openxmlformats.org/officeDocument/2006/relationships">
+<p:sld xmlns:a="http://schemas.openxmlformats.org/drawingml/2006/main" xmlns:r="http://schemas.openxmlformats.org/officeDocument/2006/relationships" xmlns:p="http://schemas.openxmlformats.org/presentationml/2006/main">
   <p:cSld>
     <p:bg>
       <p:bgPr>
         <a:solidFill>
           <a:srgbClr val="171717"/>
         </a:solidFill>
+        <a:effectLst/>
       </p:bgPr>
     </p:bg>
     <p:spTree>
@@ -3952,12 +3770,12 @@
       </p:grpSpPr>
       <p:grpSp>
         <p:nvGrpSpPr>
-          <p:cNvPr name="Group 2" id="2"/>
+          <p:cNvPr id="2" name="Group 2"/>
           <p:cNvGrpSpPr/>
           <p:nvPr/>
         </p:nvGrpSpPr>
         <p:grpSpPr>
-          <a:xfrm rot="0">
+          <a:xfrm>
             <a:off x="1481954" y="4209559"/>
             <a:ext cx="7662046" cy="1867881"/>
             <a:chOff x="0" y="0"/>
@@ -3966,12 +3784,12 @@
         </p:grpSpPr>
         <p:sp>
           <p:nvSpPr>
-            <p:cNvPr name="TextBox 3" id="3"/>
-            <p:cNvSpPr txBox="true"/>
+            <p:cNvPr id="3" name="TextBox 3"/>
+            <p:cNvSpPr txBox="1"/>
             <p:nvPr/>
           </p:nvSpPr>
           <p:spPr>
-            <a:xfrm rot="0">
+            <a:xfrm>
               <a:off x="0" y="58420"/>
               <a:ext cx="10216061" cy="1358900"/>
             </a:xfrm>
@@ -3980,7 +3798,7 @@
             </a:prstGeom>
           </p:spPr>
           <p:txBody>
-            <a:bodyPr anchor="t" rtlCol="false" tIns="0" lIns="0" bIns="0" rIns="0">
+            <a:bodyPr lIns="0" tIns="0" rIns="0" bIns="0" rtlCol="0" anchor="t">
               <a:spAutoFit/>
             </a:bodyPr>
             <a:lstStyle/>
@@ -4004,12 +3822,12 @@
         </p:sp>
         <p:sp>
           <p:nvSpPr>
-            <p:cNvPr name="TextBox 4" id="4"/>
-            <p:cNvSpPr txBox="true"/>
+            <p:cNvPr id="4" name="TextBox 4"/>
+            <p:cNvSpPr txBox="1"/>
             <p:nvPr/>
           </p:nvSpPr>
           <p:spPr>
-            <a:xfrm rot="0">
+            <a:xfrm>
               <a:off x="0" y="1834554"/>
               <a:ext cx="10216061" cy="657225"/>
             </a:xfrm>
@@ -4018,7 +3836,7 @@
             </a:prstGeom>
           </p:spPr>
           <p:txBody>
-            <a:bodyPr anchor="t" rtlCol="false" tIns="0" lIns="0" bIns="0" rIns="0">
+            <a:bodyPr lIns="0" tIns="0" rIns="0" bIns="0" rtlCol="0" anchor="t">
               <a:spAutoFit/>
             </a:bodyPr>
             <a:lstStyle/>
@@ -4028,18 +3846,19 @@
                   <a:spcPts val="3840"/>
                 </a:lnSpc>
               </a:pPr>
+              <a:endParaRPr/>
             </a:p>
           </p:txBody>
         </p:sp>
       </p:grpSp>
       <p:sp>
         <p:nvSpPr>
-          <p:cNvPr name="TextBox 5" id="5"/>
-          <p:cNvSpPr txBox="true"/>
+          <p:cNvPr id="5" name="TextBox 5"/>
+          <p:cNvSpPr txBox="1"/>
           <p:nvPr/>
         </p:nvSpPr>
         <p:spPr>
-          <a:xfrm rot="0">
+          <a:xfrm>
             <a:off x="11621532" y="2336164"/>
             <a:ext cx="5210517" cy="5500372"/>
           </a:xfrm>
@@ -4048,7 +3867,7 @@
           </a:prstGeom>
         </p:spPr>
         <p:txBody>
-          <a:bodyPr anchor="t" rtlCol="false" tIns="0" lIns="0" bIns="0" rIns="0">
+          <a:bodyPr lIns="0" tIns="0" rIns="0" bIns="0" rtlCol="0" anchor="t">
             <a:spAutoFit/>
           </a:bodyPr>
           <a:lstStyle/>
@@ -4088,133 +3907,12 @@
       </p:sp>
       <p:sp>
         <p:nvSpPr>
-          <p:cNvPr name="TextBox 6" id="6"/>
-          <p:cNvSpPr txBox="true"/>
-          <p:nvPr/>
-        </p:nvSpPr>
-        <p:spPr>
-          <a:xfrm rot="0">
-            <a:off x="16230291" y="1073312"/>
-            <a:ext cx="1124259" cy="805664"/>
-          </a:xfrm>
-          <a:prstGeom prst="rect">
-            <a:avLst/>
-          </a:prstGeom>
-        </p:spPr>
-        <p:txBody>
-          <a:bodyPr anchor="t" rtlCol="false" tIns="0" lIns="0" bIns="0" rIns="0">
-            <a:spAutoFit/>
-          </a:bodyPr>
-          <a:lstStyle/>
-          <a:p>
-            <a:pPr algn="ctr">
-              <a:lnSpc>
-                <a:spcPts val="6160"/>
-              </a:lnSpc>
-            </a:pPr>
-            <a:r>
-              <a:rPr lang="en-US" sz="5600">
-                <a:solidFill>
-                  <a:srgbClr val="FFFFFF"/>
-                </a:solidFill>
-                <a:latin typeface="Big Shoulders Display"/>
-              </a:rPr>
-              <a:t>002</a:t>
-            </a:r>
-          </a:p>
-        </p:txBody>
-      </p:sp>
-      <p:grpSp>
-        <p:nvGrpSpPr>
-          <p:cNvPr name="Group 7" id="7"/>
-          <p:cNvGrpSpPr/>
-          <p:nvPr/>
-        </p:nvGrpSpPr>
-        <p:grpSpPr>
-          <a:xfrm rot="0">
-            <a:off x="9858333" y="9067800"/>
-            <a:ext cx="1400283" cy="190500"/>
-            <a:chOff x="0" y="0"/>
-            <a:chExt cx="1867044" cy="254000"/>
-          </a:xfrm>
-        </p:grpSpPr>
-        <p:pic>
-          <p:nvPicPr>
-            <p:cNvPr name="Picture 8" id="8"/>
-            <p:cNvPicPr>
-              <a:picLocks noChangeAspect="true"/>
-            </p:cNvPicPr>
-            <p:nvPr/>
-          </p:nvPicPr>
-          <p:blipFill>
-            <a:blip r:embed="rId2">
-              <a:extLst>
-                <a:ext uri="{28A0092B-C50C-407E-A947-70E740481C1C}">
-                  <a14:useLocalDpi xmlns:a14="http://schemas.microsoft.com/office/drawing/2010/main" val="0"/>
-                </a:ext>
-                <a:ext uri="{96DAC541-7B7A-43D3-8B79-37D633B846F1}">
-                  <asvg:svgBlip xmlns:asvg="http://schemas.microsoft.com/office/drawing/2016/SVG/main" r:embed="rId3"/>
-                </a:ext>
-              </a:extLst>
-            </a:blip>
-            <a:srcRect l="0" t="0" r="0" b="0"/>
-            <a:stretch>
-              <a:fillRect/>
-            </a:stretch>
-          </p:blipFill>
-          <p:spPr>
-            <a:xfrm flipH="false" flipV="false" rot="0">
-              <a:off x="1292147" y="0"/>
-              <a:ext cx="574897" cy="254000"/>
-            </a:xfrm>
-            <a:prstGeom prst="rect">
-              <a:avLst/>
-            </a:prstGeom>
-          </p:spPr>
-        </p:pic>
-        <p:pic>
-          <p:nvPicPr>
-            <p:cNvPr name="Picture 9" id="9"/>
-            <p:cNvPicPr>
-              <a:picLocks noChangeAspect="true"/>
-            </p:cNvPicPr>
-            <p:nvPr/>
-          </p:nvPicPr>
-          <p:blipFill>
-            <a:blip r:embed="rId2">
-              <a:extLst>
-                <a:ext uri="{28A0092B-C50C-407E-A947-70E740481C1C}">
-                  <a14:useLocalDpi xmlns:a14="http://schemas.microsoft.com/office/drawing/2010/main" val="0"/>
-                </a:ext>
-                <a:ext uri="{96DAC541-7B7A-43D3-8B79-37D633B846F1}">
-                  <asvg:svgBlip xmlns:asvg="http://schemas.microsoft.com/office/drawing/2016/SVG/main" r:embed="rId3"/>
-                </a:ext>
-              </a:extLst>
-            </a:blip>
-            <a:srcRect l="0" t="0" r="0" b="0"/>
-            <a:stretch>
-              <a:fillRect/>
-            </a:stretch>
-          </p:blipFill>
-          <p:spPr>
-            <a:xfrm flipH="false" flipV="false" rot="-10800000">
-              <a:off x="0" y="0"/>
-              <a:ext cx="574897" cy="254000"/>
-            </a:xfrm>
-            <a:prstGeom prst="rect">
-              <a:avLst/>
-            </a:prstGeom>
-          </p:spPr>
-        </p:pic>
-      </p:grpSp>
-      <p:sp>
-        <p:nvSpPr>
-          <p:cNvPr name="AutoShape 10" id="10"/>
+          <p:cNvPr id="6" name="AutoShape 6"/>
           <p:cNvSpPr/>
           <p:nvPr/>
         </p:nvSpPr>
         <p:spPr>
-          <a:xfrm rot="0">
+          <a:xfrm>
             <a:off x="10553712" y="-108411"/>
             <a:ext cx="9525" cy="10503822"/>
           </a:xfrm>
@@ -4226,90 +3924,30 @@
           </a:solidFill>
         </p:spPr>
       </p:sp>
-      <p:pic>
-        <p:nvPicPr>
-          <p:cNvPr name="Picture 11" id="11"/>
-          <p:cNvPicPr>
-            <a:picLocks noChangeAspect="true"/>
-          </p:cNvPicPr>
-          <p:nvPr/>
-        </p:nvPicPr>
-        <p:blipFill>
-          <a:blip r:embed="rId4">
-            <a:extLst>
-              <a:ext uri="{28A0092B-C50C-407E-A947-70E740481C1C}">
-                <a14:useLocalDpi xmlns:a14="http://schemas.microsoft.com/office/drawing/2010/main" val="0"/>
-              </a:ext>
-              <a:ext uri="{96DAC541-7B7A-43D3-8B79-37D633B846F1}">
-                <asvg:svgBlip xmlns:asvg="http://schemas.microsoft.com/office/drawing/2016/SVG/main" r:embed="rId5"/>
-              </a:ext>
-            </a:extLst>
-          </a:blip>
-          <a:srcRect l="0" t="0" r="0" b="0"/>
-          <a:stretch>
-            <a:fillRect/>
-          </a:stretch>
-        </p:blipFill>
-        <p:spPr>
-          <a:xfrm flipH="false" flipV="false" rot="0">
-            <a:off x="16404797" y="8463612"/>
-            <a:ext cx="854503" cy="794688"/>
-          </a:xfrm>
-          <a:prstGeom prst="rect">
-            <a:avLst/>
-          </a:prstGeom>
-        </p:spPr>
-      </p:pic>
-      <p:pic>
-        <p:nvPicPr>
-          <p:cNvPr name="Picture 12" id="12"/>
-          <p:cNvPicPr>
-            <a:picLocks noChangeAspect="true"/>
-          </p:cNvPicPr>
-          <p:nvPr/>
-        </p:nvPicPr>
-        <p:blipFill>
-          <a:blip r:embed="rId6">
-            <a:extLst>
-              <a:ext uri="{28A0092B-C50C-407E-A947-70E740481C1C}">
-                <a14:useLocalDpi xmlns:a14="http://schemas.microsoft.com/office/drawing/2010/main" val="0"/>
-              </a:ext>
-              <a:ext uri="{96DAC541-7B7A-43D3-8B79-37D633B846F1}">
-                <asvg:svgBlip xmlns:asvg="http://schemas.microsoft.com/office/drawing/2016/SVG/main" r:embed="rId7"/>
-              </a:ext>
-            </a:extLst>
-          </a:blip>
-          <a:srcRect l="0" t="0" r="0" b="0"/>
-          <a:stretch>
-            <a:fillRect/>
-          </a:stretch>
-        </p:blipFill>
-        <p:spPr>
-          <a:xfrm flipH="false" flipV="false" rot="0">
-            <a:off x="1028700" y="1028700"/>
-            <a:ext cx="453254" cy="453254"/>
-          </a:xfrm>
-          <a:prstGeom prst="rect">
-            <a:avLst/>
-          </a:prstGeom>
-        </p:spPr>
-      </p:pic>
     </p:spTree>
   </p:cSld>
   <p:clrMapOvr>
     <a:masterClrMapping/>
   </p:clrMapOvr>
+  <p:timing>
+    <p:tnLst>
+      <p:par>
+        <p:cTn id="1" dur="indefinite" restart="never" nodeType="tmRoot"/>
+      </p:par>
+    </p:tnLst>
+  </p:timing>
 </p:sld>
 </file>
 
 <file path=ppt/slides/slide3.xml><?xml version="1.0" encoding="utf-8"?>
-<p:sld xmlns:p="http://schemas.openxmlformats.org/presentationml/2006/main" xmlns:a="http://schemas.openxmlformats.org/drawingml/2006/main" xmlns:r="http://schemas.openxmlformats.org/officeDocument/2006/relationships">
+<p:sld xmlns:a="http://schemas.openxmlformats.org/drawingml/2006/main" xmlns:r="http://schemas.openxmlformats.org/officeDocument/2006/relationships" xmlns:p="http://schemas.openxmlformats.org/presentationml/2006/main">
   <p:cSld>
     <p:bg>
       <p:bgPr>
         <a:solidFill>
           <a:srgbClr val="171717"/>
         </a:solidFill>
+        <a:effectLst/>
       </p:bgPr>
     </p:bg>
     <p:spTree>
@@ -4328,12 +3966,12 @@
       </p:grpSpPr>
       <p:grpSp>
         <p:nvGrpSpPr>
-          <p:cNvPr name="Group 2" id="2"/>
+          <p:cNvPr id="2" name="Group 2"/>
           <p:cNvGrpSpPr/>
           <p:nvPr/>
         </p:nvGrpSpPr>
         <p:grpSpPr>
-          <a:xfrm rot="0">
+          <a:xfrm>
             <a:off x="5449946" y="1121574"/>
             <a:ext cx="7388109" cy="7388109"/>
             <a:chOff x="0" y="0"/>
@@ -4342,9 +3980,9 @@
         </p:grpSpPr>
         <p:pic>
           <p:nvPicPr>
-            <p:cNvPr name="Picture 3" id="3"/>
+            <p:cNvPr id="3" name="Picture 3"/>
             <p:cNvPicPr>
-              <a:picLocks noChangeAspect="true"/>
+              <a:picLocks noChangeAspect="1"/>
             </p:cNvPicPr>
             <p:nvPr/>
           </p:nvPicPr>
@@ -4355,17 +3993,17 @@
                   <a14:useLocalDpi xmlns:a14="http://schemas.microsoft.com/office/drawing/2010/main" val="0"/>
                 </a:ext>
                 <a:ext uri="{96DAC541-7B7A-43D3-8B79-37D633B846F1}">
-                  <asvg:svgBlip xmlns:asvg="http://schemas.microsoft.com/office/drawing/2016/SVG/main" r:embed="rId3"/>
+                  <asvg:svgBlip xmlns:asvg="http://schemas.microsoft.com/office/drawing/2016/SVG/main" xmlns="" r:embed="rId3"/>
                 </a:ext>
               </a:extLst>
             </a:blip>
-            <a:srcRect l="0" t="0" r="0" b="0"/>
+            <a:srcRect/>
             <a:stretch>
               <a:fillRect/>
             </a:stretch>
           </p:blipFill>
           <p:spPr>
-            <a:xfrm flipH="false" flipV="false" rot="-5400000">
+            <a:xfrm rot="-5400000">
               <a:off x="0" y="0"/>
               <a:ext cx="9850812" cy="9850812"/>
             </a:xfrm>
@@ -4376,9 +4014,9 @@
         </p:pic>
         <p:pic>
           <p:nvPicPr>
-            <p:cNvPr name="Picture 4" id="4"/>
+            <p:cNvPr id="4" name="Picture 4"/>
             <p:cNvPicPr>
-              <a:picLocks noChangeAspect="true"/>
+              <a:picLocks noChangeAspect="1"/>
             </p:cNvPicPr>
             <p:nvPr/>
           </p:nvPicPr>
@@ -4389,17 +4027,17 @@
                   <a14:useLocalDpi xmlns:a14="http://schemas.microsoft.com/office/drawing/2010/main" val="0"/>
                 </a:ext>
                 <a:ext uri="{96DAC541-7B7A-43D3-8B79-37D633B846F1}">
-                  <asvg:svgBlip xmlns:asvg="http://schemas.microsoft.com/office/drawing/2016/SVG/main" r:embed="rId5"/>
+                  <asvg:svgBlip xmlns:asvg="http://schemas.microsoft.com/office/drawing/2016/SVG/main" xmlns="" r:embed="rId5"/>
                 </a:ext>
               </a:extLst>
             </a:blip>
-            <a:srcRect l="0" t="0" r="0" b="0"/>
+            <a:srcRect/>
             <a:stretch>
               <a:fillRect/>
             </a:stretch>
           </p:blipFill>
           <p:spPr>
-            <a:xfrm flipH="false" flipV="false" rot="0">
+            <a:xfrm>
               <a:off x="41142" y="41142"/>
               <a:ext cx="9768527" cy="9768527"/>
             </a:xfrm>
@@ -4409,97 +4047,14 @@
           </p:spPr>
         </p:pic>
       </p:grpSp>
-      <p:grpSp>
-        <p:nvGrpSpPr>
-          <p:cNvPr name="Group 5" id="5"/>
-          <p:cNvGrpSpPr/>
-          <p:nvPr/>
-        </p:nvGrpSpPr>
-        <p:grpSpPr>
-          <a:xfrm rot="0">
-            <a:off x="8448621" y="9677400"/>
-            <a:ext cx="1400283" cy="190500"/>
-            <a:chOff x="0" y="0"/>
-            <a:chExt cx="1867044" cy="254000"/>
-          </a:xfrm>
-        </p:grpSpPr>
-        <p:pic>
-          <p:nvPicPr>
-            <p:cNvPr name="Picture 6" id="6"/>
-            <p:cNvPicPr>
-              <a:picLocks noChangeAspect="true"/>
-            </p:cNvPicPr>
-            <p:nvPr/>
-          </p:nvPicPr>
-          <p:blipFill>
-            <a:blip r:embed="rId6">
-              <a:extLst>
-                <a:ext uri="{28A0092B-C50C-407E-A947-70E740481C1C}">
-                  <a14:useLocalDpi xmlns:a14="http://schemas.microsoft.com/office/drawing/2010/main" val="0"/>
-                </a:ext>
-                <a:ext uri="{96DAC541-7B7A-43D3-8B79-37D633B846F1}">
-                  <asvg:svgBlip xmlns:asvg="http://schemas.microsoft.com/office/drawing/2016/SVG/main" r:embed="rId7"/>
-                </a:ext>
-              </a:extLst>
-            </a:blip>
-            <a:srcRect l="0" t="0" r="0" b="0"/>
-            <a:stretch>
-              <a:fillRect/>
-            </a:stretch>
-          </p:blipFill>
-          <p:spPr>
-            <a:xfrm flipH="false" flipV="false" rot="0">
-              <a:off x="1292147" y="0"/>
-              <a:ext cx="574897" cy="254000"/>
-            </a:xfrm>
-            <a:prstGeom prst="rect">
-              <a:avLst/>
-            </a:prstGeom>
-          </p:spPr>
-        </p:pic>
-        <p:pic>
-          <p:nvPicPr>
-            <p:cNvPr name="Picture 7" id="7"/>
-            <p:cNvPicPr>
-              <a:picLocks noChangeAspect="true"/>
-            </p:cNvPicPr>
-            <p:nvPr/>
-          </p:nvPicPr>
-          <p:blipFill>
-            <a:blip r:embed="rId6">
-              <a:extLst>
-                <a:ext uri="{28A0092B-C50C-407E-A947-70E740481C1C}">
-                  <a14:useLocalDpi xmlns:a14="http://schemas.microsoft.com/office/drawing/2010/main" val="0"/>
-                </a:ext>
-                <a:ext uri="{96DAC541-7B7A-43D3-8B79-37D633B846F1}">
-                  <asvg:svgBlip xmlns:asvg="http://schemas.microsoft.com/office/drawing/2016/SVG/main" r:embed="rId7"/>
-                </a:ext>
-              </a:extLst>
-            </a:blip>
-            <a:srcRect l="0" t="0" r="0" b="0"/>
-            <a:stretch>
-              <a:fillRect/>
-            </a:stretch>
-          </p:blipFill>
-          <p:spPr>
-            <a:xfrm flipH="false" flipV="false" rot="-10800000">
-              <a:off x="0" y="0"/>
-              <a:ext cx="574897" cy="254000"/>
-            </a:xfrm>
-            <a:prstGeom prst="rect">
-              <a:avLst/>
-            </a:prstGeom>
-          </p:spPr>
-        </p:pic>
-      </p:grpSp>
-      <p:sp>
-        <p:nvSpPr>
-          <p:cNvPr name="AutoShape 8" id="8"/>
+      <p:sp>
+        <p:nvSpPr>
+          <p:cNvPr id="8" name="AutoShape 8"/>
           <p:cNvSpPr/>
           <p:nvPr/>
         </p:nvSpPr>
         <p:spPr>
-          <a:xfrm rot="0">
+          <a:xfrm>
             <a:off x="9139238" y="-108411"/>
             <a:ext cx="9525" cy="10503822"/>
           </a:xfrm>
@@ -4513,12 +4068,12 @@
       </p:sp>
       <p:sp>
         <p:nvSpPr>
-          <p:cNvPr name="AutoShape 9" id="9"/>
+          <p:cNvPr id="9" name="AutoShape 9"/>
           <p:cNvSpPr/>
           <p:nvPr/>
         </p:nvSpPr>
         <p:spPr>
-          <a:xfrm rot="0">
+          <a:xfrm>
             <a:off x="0" y="9077325"/>
             <a:ext cx="18288000" cy="9525"/>
           </a:xfrm>
@@ -4532,30 +4087,30 @@
       </p:sp>
       <p:pic>
         <p:nvPicPr>
-          <p:cNvPr name="Picture 10" id="10"/>
+          <p:cNvPr id="10" name="Picture 10"/>
           <p:cNvPicPr>
-            <a:picLocks noChangeAspect="true"/>
+            <a:picLocks noChangeAspect="1"/>
           </p:cNvPicPr>
           <p:nvPr/>
         </p:nvPicPr>
         <p:blipFill>
-          <a:blip r:embed="rId8">
+          <a:blip r:embed="rId6" cstate="print">
             <a:extLst>
               <a:ext uri="{28A0092B-C50C-407E-A947-70E740481C1C}">
                 <a14:useLocalDpi xmlns:a14="http://schemas.microsoft.com/office/drawing/2010/main" val="0"/>
               </a:ext>
               <a:ext uri="{96DAC541-7B7A-43D3-8B79-37D633B846F1}">
-                <asvg:svgBlip xmlns:asvg="http://schemas.microsoft.com/office/drawing/2016/SVG/main" r:embed="rId9"/>
+                <asvg:svgBlip xmlns:asvg="http://schemas.microsoft.com/office/drawing/2016/SVG/main" xmlns="" r:embed="rId9"/>
               </a:ext>
             </a:extLst>
           </a:blip>
-          <a:srcRect l="0" t="0" r="0" b="0"/>
+          <a:srcRect/>
           <a:stretch>
             <a:fillRect/>
           </a:stretch>
         </p:blipFill>
         <p:spPr>
-          <a:xfrm flipH="false" flipV="false" rot="0">
+          <a:xfrm>
             <a:off x="14657602" y="7244412"/>
             <a:ext cx="854503" cy="794688"/>
           </a:xfrm>
@@ -4566,32 +4121,23 @@
       </p:pic>
       <p:pic>
         <p:nvPicPr>
-          <p:cNvPr name="Picture 11" id="11"/>
+          <p:cNvPr id="11" name="Picture 11"/>
           <p:cNvPicPr>
-            <a:picLocks noChangeAspect="true"/>
+            <a:picLocks noChangeAspect="1"/>
           </p:cNvPicPr>
           <p:nvPr/>
         </p:nvPicPr>
         <p:blipFill>
-          <a:blip r:embed="rId10">
-            <a:extLst>
-              <a:ext uri="{28A0092B-C50C-407E-A947-70E740481C1C}">
-                <a14:useLocalDpi xmlns:a14="http://schemas.microsoft.com/office/drawing/2010/main" val="0"/>
-              </a:ext>
-              <a:ext uri="{96DAC541-7B7A-43D3-8B79-37D633B846F1}">
-                <asvg:svgBlip xmlns:asvg="http://schemas.microsoft.com/office/drawing/2016/SVG/main" r:embed="rId11"/>
-              </a:ext>
-            </a:extLst>
-          </a:blip>
-          <a:srcRect l="0" t="0" r="0" b="0"/>
+          <a:blip r:embed="rId10"/>
+          <a:srcRect/>
           <a:stretch>
             <a:fillRect/>
           </a:stretch>
         </p:blipFill>
         <p:spPr>
-          <a:xfrm flipH="false" flipV="false" rot="0">
-            <a:off x="1028700" y="1028700"/>
-            <a:ext cx="453254" cy="453254"/>
+          <a:xfrm>
+            <a:off x="1028700" y="468678"/>
+            <a:ext cx="7564963" cy="8048625"/>
           </a:xfrm>
           <a:prstGeom prst="rect">
             <a:avLst/>
@@ -4600,71 +4146,46 @@
       </p:pic>
       <p:pic>
         <p:nvPicPr>
-          <p:cNvPr name="Picture 12" id="12"/>
+          <p:cNvPr id="12" name="Picture 12"/>
           <p:cNvPicPr>
-            <a:picLocks noChangeAspect="true"/>
+            <a:picLocks noChangeAspect="1"/>
           </p:cNvPicPr>
           <p:nvPr/>
         </p:nvPicPr>
         <p:blipFill>
-          <a:blip r:embed="rId12"/>
-          <a:srcRect l="0" t="0" r="0" b="0"/>
+          <a:blip r:embed="rId11"/>
+          <a:srcRect/>
           <a:stretch>
             <a:fillRect/>
           </a:stretch>
         </p:blipFill>
         <p:spPr>
-          <a:xfrm flipH="false" flipV="false" rot="0">
-            <a:off x="1076325" y="1028700"/>
-            <a:ext cx="7564963" cy="8048625"/>
+          <a:xfrm>
+            <a:off x="9848904" y="552027"/>
+            <a:ext cx="7009960" cy="7965276"/>
           </a:xfrm>
           <a:prstGeom prst="rect">
             <a:avLst/>
           </a:prstGeom>
         </p:spPr>
       </p:pic>
-      <p:pic>
-        <p:nvPicPr>
-          <p:cNvPr name="Picture 13" id="13"/>
-          <p:cNvPicPr>
-            <a:picLocks noChangeAspect="true"/>
-          </p:cNvPicPr>
+      <p:sp>
+        <p:nvSpPr>
+          <p:cNvPr id="13" name="TextBox 13"/>
+          <p:cNvSpPr txBox="1"/>
           <p:nvPr/>
-        </p:nvPicPr>
-        <p:blipFill>
-          <a:blip r:embed="rId13"/>
-          <a:srcRect l="0" t="0" r="0" b="0"/>
-          <a:stretch>
-            <a:fillRect/>
-          </a:stretch>
-        </p:blipFill>
-        <p:spPr>
-          <a:xfrm flipH="false" flipV="false" rot="0">
-            <a:off x="9626639" y="1121574"/>
-            <a:ext cx="7009960" cy="7965276"/>
+        </p:nvSpPr>
+        <p:spPr>
+          <a:xfrm>
+            <a:off x="1028700" y="9210675"/>
+            <a:ext cx="5726109" cy="348615"/>
           </a:xfrm>
           <a:prstGeom prst="rect">
             <a:avLst/>
           </a:prstGeom>
         </p:spPr>
-      </p:pic>
-      <p:sp>
-        <p:nvSpPr>
-          <p:cNvPr name="TextBox 14" id="14"/>
-          <p:cNvSpPr txBox="true"/>
-          <p:nvPr/>
-        </p:nvSpPr>
-        <p:spPr>
-          <a:xfrm rot="0">
-            <a:off x="1028700" y="9210675"/>
-            <a:ext cx="5726109" cy="348615"/>
-          </a:xfrm>
-          <a:prstGeom prst="rect">
-            <a:avLst/>
-          </a:prstGeom>
-        </p:spPr>
-        <p:txBody>
-          <a:bodyPr anchor="t" rtlCol="false" tIns="0" lIns="0" bIns="0" rIns="0">
+        <p:txBody>
+          <a:bodyPr lIns="0" tIns="0" rIns="0" bIns="0" rtlCol="0" anchor="t">
             <a:spAutoFit/>
           </a:bodyPr>
           <a:lstStyle/>
@@ -4688,59 +4209,21 @@
       </p:sp>
       <p:sp>
         <p:nvSpPr>
-          <p:cNvPr name="TextBox 15" id="15"/>
-          <p:cNvSpPr txBox="true"/>
+          <p:cNvPr id="15" name="TextBox 15"/>
+          <p:cNvSpPr txBox="1"/>
           <p:nvPr/>
         </p:nvSpPr>
         <p:spPr>
-          <a:xfrm rot="0">
-            <a:off x="16646124" y="1078368"/>
-            <a:ext cx="791589" cy="795553"/>
+          <a:xfrm>
+            <a:off x="9848904" y="9210675"/>
+            <a:ext cx="5726109" cy="348615"/>
           </a:xfrm>
           <a:prstGeom prst="rect">
             <a:avLst/>
           </a:prstGeom>
         </p:spPr>
         <p:txBody>
-          <a:bodyPr anchor="t" rtlCol="false" tIns="0" lIns="0" bIns="0" rIns="0">
-            <a:spAutoFit/>
-          </a:bodyPr>
-          <a:lstStyle/>
-          <a:p>
-            <a:pPr algn="ctr">
-              <a:lnSpc>
-                <a:spcPts val="6160"/>
-              </a:lnSpc>
-            </a:pPr>
-            <a:r>
-              <a:rPr lang="en-US" sz="5599">
-                <a:solidFill>
-                  <a:srgbClr val="FFFFFF"/>
-                </a:solidFill>
-                <a:latin typeface="Big Shoulders Display"/>
-              </a:rPr>
-              <a:t>003</a:t>
-            </a:r>
-          </a:p>
-        </p:txBody>
-      </p:sp>
-      <p:sp>
-        <p:nvSpPr>
-          <p:cNvPr name="TextBox 16" id="16"/>
-          <p:cNvSpPr txBox="true"/>
-          <p:nvPr/>
-        </p:nvSpPr>
-        <p:spPr>
-          <a:xfrm rot="0">
-            <a:off x="9848904" y="9210675"/>
-            <a:ext cx="5726109" cy="348615"/>
-          </a:xfrm>
-          <a:prstGeom prst="rect">
-            <a:avLst/>
-          </a:prstGeom>
-        </p:spPr>
-        <p:txBody>
-          <a:bodyPr anchor="t" rtlCol="false" tIns="0" lIns="0" bIns="0" rIns="0">
+          <a:bodyPr lIns="0" tIns="0" rIns="0" bIns="0" rtlCol="0" anchor="t">
             <a:spAutoFit/>
           </a:bodyPr>
           <a:lstStyle/>
@@ -4767,17 +4250,25 @@
   <p:clrMapOvr>
     <a:masterClrMapping/>
   </p:clrMapOvr>
+  <p:timing>
+    <p:tnLst>
+      <p:par>
+        <p:cTn id="1" dur="indefinite" restart="never" nodeType="tmRoot"/>
+      </p:par>
+    </p:tnLst>
+  </p:timing>
 </p:sld>
 </file>
 
 <file path=ppt/slides/slide4.xml><?xml version="1.0" encoding="utf-8"?>
-<p:sld xmlns:p="http://schemas.openxmlformats.org/presentationml/2006/main" xmlns:a="http://schemas.openxmlformats.org/drawingml/2006/main" xmlns:r="http://schemas.openxmlformats.org/officeDocument/2006/relationships">
+<p:sld xmlns:a="http://schemas.openxmlformats.org/drawingml/2006/main" xmlns:r="http://schemas.openxmlformats.org/officeDocument/2006/relationships" xmlns:p="http://schemas.openxmlformats.org/presentationml/2006/main">
   <p:cSld>
     <p:bg>
       <p:bgPr>
         <a:solidFill>
           <a:srgbClr val="171717"/>
         </a:solidFill>
+        <a:effectLst/>
       </p:bgPr>
     </p:bg>
     <p:spTree>
@@ -4796,12 +4287,12 @@
       </p:grpSpPr>
       <p:grpSp>
         <p:nvGrpSpPr>
-          <p:cNvPr name="Group 2" id="2"/>
+          <p:cNvPr id="2" name="Group 2"/>
           <p:cNvGrpSpPr/>
           <p:nvPr/>
         </p:nvGrpSpPr>
         <p:grpSpPr>
-          <a:xfrm rot="0">
+          <a:xfrm>
             <a:off x="1028700" y="2400300"/>
             <a:ext cx="13716000" cy="3584536"/>
             <a:chOff x="0" y="0"/>
@@ -4810,12 +4301,12 @@
         </p:grpSpPr>
         <p:sp>
           <p:nvSpPr>
-            <p:cNvPr name="TextBox 3" id="3"/>
-            <p:cNvSpPr txBox="true"/>
+            <p:cNvPr id="3" name="TextBox 3"/>
+            <p:cNvSpPr txBox="1"/>
             <p:nvPr/>
           </p:nvSpPr>
           <p:spPr>
-            <a:xfrm rot="0">
+            <a:xfrm>
               <a:off x="0" y="-9525"/>
               <a:ext cx="18288001" cy="3362325"/>
             </a:xfrm>
@@ -4824,7 +4315,7 @@
             </a:prstGeom>
           </p:spPr>
           <p:txBody>
-            <a:bodyPr anchor="t" rtlCol="false" tIns="0" lIns="0" bIns="0" rIns="0">
+            <a:bodyPr lIns="0" tIns="0" rIns="0" bIns="0" rtlCol="0" anchor="t">
               <a:spAutoFit/>
             </a:bodyPr>
             <a:lstStyle/>
@@ -4848,12 +4339,12 @@
         </p:sp>
         <p:sp>
           <p:nvSpPr>
-            <p:cNvPr name="TextBox 4" id="4"/>
-            <p:cNvSpPr txBox="true"/>
+            <p:cNvPr id="4" name="TextBox 4"/>
+            <p:cNvSpPr txBox="1"/>
             <p:nvPr/>
           </p:nvSpPr>
           <p:spPr>
-            <a:xfrm rot="0">
+            <a:xfrm>
               <a:off x="0" y="4124697"/>
               <a:ext cx="15525978" cy="657225"/>
             </a:xfrm>
@@ -4862,7 +4353,7 @@
             </a:prstGeom>
           </p:spPr>
           <p:txBody>
-            <a:bodyPr anchor="t" rtlCol="false" tIns="0" lIns="0" bIns="0" rIns="0">
+            <a:bodyPr lIns="0" tIns="0" rIns="0" bIns="0" rtlCol="0" anchor="t">
               <a:spAutoFit/>
             </a:bodyPr>
             <a:lstStyle/>
@@ -4887,70 +4378,70 @@
       </p:grpSp>
       <p:sp>
         <p:nvSpPr>
-          <p:cNvPr name="TextBox 5" id="5"/>
-          <p:cNvSpPr txBox="true"/>
+          <p:cNvPr id="5" name="TextBox 5"/>
+          <p:cNvSpPr txBox="1"/>
           <p:nvPr/>
         </p:nvSpPr>
         <p:spPr>
-          <a:xfrm rot="0">
-            <a:off x="1028700" y="6600211"/>
-            <a:ext cx="5943600" cy="1432560"/>
+          <a:xfrm>
+            <a:off x="1028700" y="6590686"/>
+            <a:ext cx="5943600" cy="1655445"/>
           </a:xfrm>
           <a:prstGeom prst="rect">
             <a:avLst/>
           </a:prstGeom>
         </p:spPr>
         <p:txBody>
-          <a:bodyPr anchor="t" rtlCol="false" tIns="0" lIns="0" bIns="0" rIns="0">
+          <a:bodyPr lIns="0" tIns="0" rIns="0" bIns="0" rtlCol="0" anchor="t">
             <a:spAutoFit/>
           </a:bodyPr>
           <a:lstStyle/>
           <a:p>
             <a:pPr>
               <a:lnSpc>
-                <a:spcPts val="2880"/>
+                <a:spcPts val="3359"/>
               </a:lnSpc>
             </a:pPr>
             <a:r>
-              <a:rPr lang="en-US" sz="1800">
+              <a:rPr lang="en-US" sz="2099">
                 <a:solidFill>
                   <a:srgbClr val="FFFFFF"/>
                 </a:solidFill>
                 <a:latin typeface="Lato"/>
               </a:rPr>
-              <a:t>После проверки введенных данных в окне регистрации заранее придуманных валидаторов они вносятся в таблицу базы данных. Пароль, естественно, подвергается хешированию.</a:t>
-            </a:r>
-          </a:p>
-        </p:txBody>
-      </p:sp>
-      <p:sp>
-        <p:nvSpPr>
-          <p:cNvPr name="TextBox 6" id="6"/>
-          <p:cNvSpPr txBox="true"/>
+              <a:t>После проверки введенных данных в окне регистрации валидаторами они вносятся в таблицу базы данных. Пароль хранится в хешированном виде.</a:t>
+            </a:r>
+          </a:p>
+        </p:txBody>
+      </p:sp>
+      <p:sp>
+        <p:nvSpPr>
+          <p:cNvPr id="6" name="TextBox 6"/>
+          <p:cNvSpPr txBox="1"/>
           <p:nvPr/>
         </p:nvSpPr>
         <p:spPr>
-          <a:xfrm rot="0">
-            <a:off x="8801100" y="6600211"/>
-            <a:ext cx="5943600" cy="708660"/>
+          <a:xfrm>
+            <a:off x="8801100" y="6590686"/>
+            <a:ext cx="5943600" cy="817245"/>
           </a:xfrm>
           <a:prstGeom prst="rect">
             <a:avLst/>
           </a:prstGeom>
         </p:spPr>
         <p:txBody>
-          <a:bodyPr anchor="t" rtlCol="false" tIns="0" lIns="0" bIns="0" rIns="0">
+          <a:bodyPr lIns="0" tIns="0" rIns="0" bIns="0" rtlCol="0" anchor="t">
             <a:spAutoFit/>
           </a:bodyPr>
           <a:lstStyle/>
           <a:p>
             <a:pPr>
               <a:lnSpc>
-                <a:spcPts val="2880"/>
+                <a:spcPts val="3359"/>
               </a:lnSpc>
             </a:pPr>
             <a:r>
-              <a:rPr lang="en-US" sz="1800">
+              <a:rPr lang="en-US" sz="2099">
                 <a:solidFill>
                   <a:srgbClr val="FFFFFF"/>
                 </a:solidFill>
@@ -4963,133 +4454,12 @@
       </p:sp>
       <p:sp>
         <p:nvSpPr>
-          <p:cNvPr name="TextBox 7" id="7"/>
-          <p:cNvSpPr txBox="true"/>
-          <p:nvPr/>
-        </p:nvSpPr>
-        <p:spPr>
-          <a:xfrm rot="0">
-            <a:off x="16472015" y="1078368"/>
-            <a:ext cx="1124259" cy="795553"/>
-          </a:xfrm>
-          <a:prstGeom prst="rect">
-            <a:avLst/>
-          </a:prstGeom>
-        </p:spPr>
-        <p:txBody>
-          <a:bodyPr anchor="t" rtlCol="false" tIns="0" lIns="0" bIns="0" rIns="0">
-            <a:spAutoFit/>
-          </a:bodyPr>
-          <a:lstStyle/>
-          <a:p>
-            <a:pPr algn="ctr">
-              <a:lnSpc>
-                <a:spcPts val="6160"/>
-              </a:lnSpc>
-            </a:pPr>
-            <a:r>
-              <a:rPr lang="en-US" sz="5600">
-                <a:solidFill>
-                  <a:srgbClr val="FFFFFF"/>
-                </a:solidFill>
-                <a:latin typeface="Big Shoulders Display"/>
-              </a:rPr>
-              <a:t>004</a:t>
-            </a:r>
-          </a:p>
-        </p:txBody>
-      </p:sp>
-      <p:grpSp>
-        <p:nvGrpSpPr>
-          <p:cNvPr name="Group 8" id="8"/>
-          <p:cNvGrpSpPr/>
-          <p:nvPr/>
-        </p:nvGrpSpPr>
-        <p:grpSpPr>
-          <a:xfrm rot="0">
-            <a:off x="1028700" y="9539656"/>
-            <a:ext cx="1400283" cy="190500"/>
-            <a:chOff x="0" y="0"/>
-            <a:chExt cx="1867044" cy="254000"/>
-          </a:xfrm>
-        </p:grpSpPr>
-        <p:pic>
-          <p:nvPicPr>
-            <p:cNvPr name="Picture 9" id="9"/>
-            <p:cNvPicPr>
-              <a:picLocks noChangeAspect="true"/>
-            </p:cNvPicPr>
-            <p:nvPr/>
-          </p:nvPicPr>
-          <p:blipFill>
-            <a:blip r:embed="rId2">
-              <a:extLst>
-                <a:ext uri="{28A0092B-C50C-407E-A947-70E740481C1C}">
-                  <a14:useLocalDpi xmlns:a14="http://schemas.microsoft.com/office/drawing/2010/main" val="0"/>
-                </a:ext>
-                <a:ext uri="{96DAC541-7B7A-43D3-8B79-37D633B846F1}">
-                  <asvg:svgBlip xmlns:asvg="http://schemas.microsoft.com/office/drawing/2016/SVG/main" r:embed="rId3"/>
-                </a:ext>
-              </a:extLst>
-            </a:blip>
-            <a:srcRect l="0" t="0" r="0" b="0"/>
-            <a:stretch>
-              <a:fillRect/>
-            </a:stretch>
-          </p:blipFill>
-          <p:spPr>
-            <a:xfrm flipH="false" flipV="false" rot="0">
-              <a:off x="1292147" y="0"/>
-              <a:ext cx="574897" cy="254000"/>
-            </a:xfrm>
-            <a:prstGeom prst="rect">
-              <a:avLst/>
-            </a:prstGeom>
-          </p:spPr>
-        </p:pic>
-        <p:pic>
-          <p:nvPicPr>
-            <p:cNvPr name="Picture 10" id="10"/>
-            <p:cNvPicPr>
-              <a:picLocks noChangeAspect="true"/>
-            </p:cNvPicPr>
-            <p:nvPr/>
-          </p:nvPicPr>
-          <p:blipFill>
-            <a:blip r:embed="rId2">
-              <a:extLst>
-                <a:ext uri="{28A0092B-C50C-407E-A947-70E740481C1C}">
-                  <a14:useLocalDpi xmlns:a14="http://schemas.microsoft.com/office/drawing/2010/main" val="0"/>
-                </a:ext>
-                <a:ext uri="{96DAC541-7B7A-43D3-8B79-37D633B846F1}">
-                  <asvg:svgBlip xmlns:asvg="http://schemas.microsoft.com/office/drawing/2016/SVG/main" r:embed="rId3"/>
-                </a:ext>
-              </a:extLst>
-            </a:blip>
-            <a:srcRect l="0" t="0" r="0" b="0"/>
-            <a:stretch>
-              <a:fillRect/>
-            </a:stretch>
-          </p:blipFill>
-          <p:spPr>
-            <a:xfrm flipH="false" flipV="false" rot="-10800000">
-              <a:off x="0" y="0"/>
-              <a:ext cx="574897" cy="254000"/>
-            </a:xfrm>
-            <a:prstGeom prst="rect">
-              <a:avLst/>
-            </a:prstGeom>
-          </p:spPr>
-        </p:pic>
-      </p:grpSp>
-      <p:sp>
-        <p:nvSpPr>
-          <p:cNvPr name="AutoShape 11" id="11"/>
+          <p:cNvPr id="8" name="AutoShape 8"/>
           <p:cNvSpPr/>
           <p:nvPr/>
         </p:nvSpPr>
         <p:spPr>
-          <a:xfrm rot="0">
+          <a:xfrm>
             <a:off x="15721248" y="-108411"/>
             <a:ext cx="9525" cy="10503822"/>
           </a:xfrm>
@@ -5101,75 +4471,30 @@
           </a:solidFill>
         </p:spPr>
       </p:sp>
-      <p:sp>
-        <p:nvSpPr>
-          <p:cNvPr name="AutoShape 12" id="12"/>
-          <p:cNvSpPr/>
-          <p:nvPr/>
-        </p:nvSpPr>
-        <p:spPr>
-          <a:xfrm rot="0">
-            <a:off x="-2566752" y="9077325"/>
-            <a:ext cx="18288000" cy="9525"/>
-          </a:xfrm>
-          <a:prstGeom prst="rect">
-            <a:avLst/>
-          </a:prstGeom>
-          <a:solidFill>
-            <a:srgbClr val="FFFFFF"/>
-          </a:solidFill>
-        </p:spPr>
-      </p:sp>
-      <p:pic>
-        <p:nvPicPr>
-          <p:cNvPr name="Picture 13" id="13"/>
-          <p:cNvPicPr>
-            <a:picLocks noChangeAspect="true"/>
-          </p:cNvPicPr>
-          <p:nvPr/>
-        </p:nvPicPr>
-        <p:blipFill>
-          <a:blip r:embed="rId4">
-            <a:extLst>
-              <a:ext uri="{28A0092B-C50C-407E-A947-70E740481C1C}">
-                <a14:useLocalDpi xmlns:a14="http://schemas.microsoft.com/office/drawing/2010/main" val="0"/>
-              </a:ext>
-              <a:ext uri="{96DAC541-7B7A-43D3-8B79-37D633B846F1}">
-                <asvg:svgBlip xmlns:asvg="http://schemas.microsoft.com/office/drawing/2016/SVG/main" r:embed="rId5"/>
-              </a:ext>
-            </a:extLst>
-          </a:blip>
-          <a:srcRect l="0" t="0" r="0" b="0"/>
-          <a:stretch>
-            <a:fillRect/>
-          </a:stretch>
-        </p:blipFill>
-        <p:spPr>
-          <a:xfrm flipH="false" flipV="false" rot="0">
-            <a:off x="1028700" y="1028700"/>
-            <a:ext cx="453254" cy="453254"/>
-          </a:xfrm>
-          <a:prstGeom prst="rect">
-            <a:avLst/>
-          </a:prstGeom>
-        </p:spPr>
-      </p:pic>
     </p:spTree>
   </p:cSld>
   <p:clrMapOvr>
     <a:masterClrMapping/>
   </p:clrMapOvr>
+  <p:timing>
+    <p:tnLst>
+      <p:par>
+        <p:cTn id="1" dur="indefinite" restart="never" nodeType="tmRoot"/>
+      </p:par>
+    </p:tnLst>
+  </p:timing>
 </p:sld>
 </file>
 
 <file path=ppt/slides/slide5.xml><?xml version="1.0" encoding="utf-8"?>
-<p:sld xmlns:p="http://schemas.openxmlformats.org/presentationml/2006/main" xmlns:a="http://schemas.openxmlformats.org/drawingml/2006/main" xmlns:r="http://schemas.openxmlformats.org/officeDocument/2006/relationships">
+<p:sld xmlns:a="http://schemas.openxmlformats.org/drawingml/2006/main" xmlns:r="http://schemas.openxmlformats.org/officeDocument/2006/relationships" xmlns:p="http://schemas.openxmlformats.org/presentationml/2006/main">
   <p:cSld>
     <p:bg>
       <p:bgPr>
         <a:solidFill>
           <a:srgbClr val="1B1939"/>
         </a:solidFill>
+        <a:effectLst/>
       </p:bgPr>
     </p:bg>
     <p:spTree>
@@ -5188,12 +4513,12 @@
       </p:grpSpPr>
       <p:grpSp>
         <p:nvGrpSpPr>
-          <p:cNvPr name="Group 2" id="2"/>
+          <p:cNvPr id="2" name="Group 2"/>
           <p:cNvGrpSpPr/>
           <p:nvPr/>
         </p:nvGrpSpPr>
         <p:grpSpPr>
-          <a:xfrm rot="0">
+          <a:xfrm>
             <a:off x="15241646" y="1028700"/>
             <a:ext cx="7388109" cy="7388109"/>
             <a:chOff x="0" y="0"/>
@@ -5202,9 +4527,9 @@
         </p:grpSpPr>
         <p:pic>
           <p:nvPicPr>
-            <p:cNvPr name="Picture 3" id="3"/>
+            <p:cNvPr id="3" name="Picture 3"/>
             <p:cNvPicPr>
-              <a:picLocks noChangeAspect="true"/>
+              <a:picLocks noChangeAspect="1"/>
             </p:cNvPicPr>
             <p:nvPr/>
           </p:nvPicPr>
@@ -5215,17 +4540,17 @@
                   <a14:useLocalDpi xmlns:a14="http://schemas.microsoft.com/office/drawing/2010/main" val="0"/>
                 </a:ext>
                 <a:ext uri="{96DAC541-7B7A-43D3-8B79-37D633B846F1}">
-                  <asvg:svgBlip xmlns:asvg="http://schemas.microsoft.com/office/drawing/2016/SVG/main" r:embed="rId3"/>
+                  <asvg:svgBlip xmlns:asvg="http://schemas.microsoft.com/office/drawing/2016/SVG/main" xmlns="" r:embed="rId3"/>
                 </a:ext>
               </a:extLst>
             </a:blip>
-            <a:srcRect l="0" t="0" r="0" b="0"/>
+            <a:srcRect/>
             <a:stretch>
               <a:fillRect/>
             </a:stretch>
           </p:blipFill>
           <p:spPr>
-            <a:xfrm flipH="false" flipV="false" rot="-5400000">
+            <a:xfrm rot="-5400000">
               <a:off x="0" y="0"/>
               <a:ext cx="9850812" cy="9850812"/>
             </a:xfrm>
@@ -5236,9 +4561,9 @@
         </p:pic>
         <p:pic>
           <p:nvPicPr>
-            <p:cNvPr name="Picture 4" id="4"/>
+            <p:cNvPr id="4" name="Picture 4"/>
             <p:cNvPicPr>
-              <a:picLocks noChangeAspect="true"/>
+              <a:picLocks noChangeAspect="1"/>
             </p:cNvPicPr>
             <p:nvPr/>
           </p:nvPicPr>
@@ -5249,17 +4574,17 @@
                   <a14:useLocalDpi xmlns:a14="http://schemas.microsoft.com/office/drawing/2010/main" val="0"/>
                 </a:ext>
                 <a:ext uri="{96DAC541-7B7A-43D3-8B79-37D633B846F1}">
-                  <asvg:svgBlip xmlns:asvg="http://schemas.microsoft.com/office/drawing/2016/SVG/main" r:embed="rId5"/>
+                  <asvg:svgBlip xmlns:asvg="http://schemas.microsoft.com/office/drawing/2016/SVG/main" xmlns="" r:embed="rId5"/>
                 </a:ext>
               </a:extLst>
             </a:blip>
-            <a:srcRect l="0" t="0" r="0" b="0"/>
+            <a:srcRect/>
             <a:stretch>
               <a:fillRect/>
             </a:stretch>
           </p:blipFill>
           <p:spPr>
-            <a:xfrm flipH="false" flipV="false" rot="0">
+            <a:xfrm>
               <a:off x="41142" y="41142"/>
               <a:ext cx="9768527" cy="9768527"/>
             </a:xfrm>
@@ -5269,97 +4594,14 @@
           </p:spPr>
         </p:pic>
       </p:grpSp>
-      <p:grpSp>
-        <p:nvGrpSpPr>
-          <p:cNvPr name="Group 5" id="5"/>
-          <p:cNvGrpSpPr/>
-          <p:nvPr/>
-        </p:nvGrpSpPr>
-        <p:grpSpPr>
-          <a:xfrm rot="0">
-            <a:off x="1028700" y="9539656"/>
-            <a:ext cx="1400283" cy="190500"/>
-            <a:chOff x="0" y="0"/>
-            <a:chExt cx="1867044" cy="254000"/>
-          </a:xfrm>
-        </p:grpSpPr>
-        <p:pic>
-          <p:nvPicPr>
-            <p:cNvPr name="Picture 6" id="6"/>
-            <p:cNvPicPr>
-              <a:picLocks noChangeAspect="true"/>
-            </p:cNvPicPr>
-            <p:nvPr/>
-          </p:nvPicPr>
-          <p:blipFill>
-            <a:blip r:embed="rId6">
-              <a:extLst>
-                <a:ext uri="{28A0092B-C50C-407E-A947-70E740481C1C}">
-                  <a14:useLocalDpi xmlns:a14="http://schemas.microsoft.com/office/drawing/2010/main" val="0"/>
-                </a:ext>
-                <a:ext uri="{96DAC541-7B7A-43D3-8B79-37D633B846F1}">
-                  <asvg:svgBlip xmlns:asvg="http://schemas.microsoft.com/office/drawing/2016/SVG/main" r:embed="rId7"/>
-                </a:ext>
-              </a:extLst>
-            </a:blip>
-            <a:srcRect l="0" t="0" r="0" b="0"/>
-            <a:stretch>
-              <a:fillRect/>
-            </a:stretch>
-          </p:blipFill>
-          <p:spPr>
-            <a:xfrm flipH="false" flipV="false" rot="0">
-              <a:off x="1292147" y="0"/>
-              <a:ext cx="574897" cy="254000"/>
-            </a:xfrm>
-            <a:prstGeom prst="rect">
-              <a:avLst/>
-            </a:prstGeom>
-          </p:spPr>
-        </p:pic>
-        <p:pic>
-          <p:nvPicPr>
-            <p:cNvPr name="Picture 7" id="7"/>
-            <p:cNvPicPr>
-              <a:picLocks noChangeAspect="true"/>
-            </p:cNvPicPr>
-            <p:nvPr/>
-          </p:nvPicPr>
-          <p:blipFill>
-            <a:blip r:embed="rId6">
-              <a:extLst>
-                <a:ext uri="{28A0092B-C50C-407E-A947-70E740481C1C}">
-                  <a14:useLocalDpi xmlns:a14="http://schemas.microsoft.com/office/drawing/2010/main" val="0"/>
-                </a:ext>
-                <a:ext uri="{96DAC541-7B7A-43D3-8B79-37D633B846F1}">
-                  <asvg:svgBlip xmlns:asvg="http://schemas.microsoft.com/office/drawing/2016/SVG/main" r:embed="rId7"/>
-                </a:ext>
-              </a:extLst>
-            </a:blip>
-            <a:srcRect l="0" t="0" r="0" b="0"/>
-            <a:stretch>
-              <a:fillRect/>
-            </a:stretch>
-          </p:blipFill>
-          <p:spPr>
-            <a:xfrm flipH="false" flipV="false" rot="-10800000">
-              <a:off x="0" y="0"/>
-              <a:ext cx="574897" cy="254000"/>
-            </a:xfrm>
-            <a:prstGeom prst="rect">
-              <a:avLst/>
-            </a:prstGeom>
-          </p:spPr>
-        </p:pic>
-      </p:grpSp>
-      <p:sp>
-        <p:nvSpPr>
-          <p:cNvPr name="AutoShape 8" id="8"/>
+      <p:sp>
+        <p:nvSpPr>
+          <p:cNvPr id="5" name="AutoShape 5"/>
           <p:cNvSpPr/>
           <p:nvPr/>
         </p:nvSpPr>
         <p:spPr>
-          <a:xfrm rot="0">
+          <a:xfrm>
             <a:off x="0" y="9077325"/>
             <a:ext cx="18288000" cy="9525"/>
           </a:xfrm>
@@ -5373,12 +4615,12 @@
       </p:sp>
       <p:grpSp>
         <p:nvGrpSpPr>
-          <p:cNvPr name="Group 9" id="9"/>
+          <p:cNvPr id="6" name="Group 6"/>
           <p:cNvGrpSpPr/>
           <p:nvPr/>
         </p:nvGrpSpPr>
         <p:grpSpPr>
-          <a:xfrm rot="0">
+          <a:xfrm>
             <a:off x="4199659" y="3198061"/>
             <a:ext cx="9888682" cy="3890877"/>
             <a:chOff x="0" y="0"/>
@@ -5387,12 +4629,12 @@
         </p:grpSpPr>
         <p:sp>
           <p:nvSpPr>
-            <p:cNvPr name="TextBox 10" id="10"/>
-            <p:cNvSpPr txBox="true"/>
+            <p:cNvPr id="7" name="TextBox 7"/>
+            <p:cNvSpPr txBox="1"/>
             <p:nvPr/>
           </p:nvSpPr>
           <p:spPr>
-            <a:xfrm rot="0">
+            <a:xfrm>
               <a:off x="0" y="53693"/>
               <a:ext cx="13184909" cy="3946525"/>
             </a:xfrm>
@@ -5401,7 +4643,7 @@
             </a:prstGeom>
           </p:spPr>
           <p:txBody>
-            <a:bodyPr anchor="t" rtlCol="false" tIns="0" lIns="0" bIns="0" rIns="0">
+            <a:bodyPr lIns="0" tIns="0" rIns="0" bIns="0" rtlCol="0" anchor="t">
               <a:spAutoFit/>
             </a:bodyPr>
             <a:lstStyle/>
@@ -5425,12 +4667,12 @@
         </p:sp>
         <p:sp>
           <p:nvSpPr>
-            <p:cNvPr name="TextBox 11" id="11"/>
-            <p:cNvSpPr txBox="true"/>
+            <p:cNvPr id="8" name="TextBox 8"/>
+            <p:cNvSpPr txBox="1"/>
             <p:nvPr/>
           </p:nvSpPr>
           <p:spPr>
-            <a:xfrm rot="0">
+            <a:xfrm>
               <a:off x="0" y="4756036"/>
               <a:ext cx="9171131" cy="436880"/>
             </a:xfrm>
@@ -5439,12 +4681,12 @@
             </a:prstGeom>
           </p:spPr>
           <p:txBody>
-            <a:bodyPr anchor="t" rtlCol="false" tIns="0" lIns="0" bIns="0" rIns="0">
+            <a:bodyPr lIns="0" tIns="0" rIns="0" bIns="0" rtlCol="0" anchor="t">
               <a:spAutoFit/>
             </a:bodyPr>
             <a:lstStyle/>
             <a:p>
-              <a:pPr algn="l" marL="0" indent="0" lvl="1">
+              <a:pPr marL="0" lvl="1" indent="0" algn="l">
                 <a:lnSpc>
                   <a:spcPts val="2880"/>
                 </a:lnSpc>
@@ -5452,60 +4694,35 @@
                   <a:spcPct val="0"/>
                 </a:spcBef>
               </a:pPr>
+              <a:endParaRPr/>
             </a:p>
           </p:txBody>
         </p:sp>
       </p:grpSp>
-      <p:pic>
-        <p:nvPicPr>
-          <p:cNvPr name="Picture 12" id="12"/>
-          <p:cNvPicPr>
-            <a:picLocks noChangeAspect="true"/>
-          </p:cNvPicPr>
-          <p:nvPr/>
-        </p:nvPicPr>
-        <p:blipFill>
-          <a:blip r:embed="rId8">
-            <a:extLst>
-              <a:ext uri="{28A0092B-C50C-407E-A947-70E740481C1C}">
-                <a14:useLocalDpi xmlns:a14="http://schemas.microsoft.com/office/drawing/2010/main" val="0"/>
-              </a:ext>
-              <a:ext uri="{96DAC541-7B7A-43D3-8B79-37D633B846F1}">
-                <asvg:svgBlip xmlns:asvg="http://schemas.microsoft.com/office/drawing/2016/SVG/main" r:embed="rId9"/>
-              </a:ext>
-            </a:extLst>
-          </a:blip>
-          <a:srcRect l="0" t="0" r="0" b="0"/>
-          <a:stretch>
-            <a:fillRect/>
-          </a:stretch>
-        </p:blipFill>
-        <p:spPr>
-          <a:xfrm flipH="false" flipV="false" rot="0">
-            <a:off x="1028700" y="1028700"/>
-            <a:ext cx="453254" cy="453254"/>
-          </a:xfrm>
-          <a:prstGeom prst="rect">
-            <a:avLst/>
-          </a:prstGeom>
-        </p:spPr>
-      </p:pic>
     </p:spTree>
   </p:cSld>
   <p:clrMapOvr>
     <a:masterClrMapping/>
   </p:clrMapOvr>
+  <p:timing>
+    <p:tnLst>
+      <p:par>
+        <p:cTn id="1" dur="indefinite" restart="never" nodeType="tmRoot"/>
+      </p:par>
+    </p:tnLst>
+  </p:timing>
 </p:sld>
 </file>
 
 <file path=ppt/slides/slide6.xml><?xml version="1.0" encoding="utf-8"?>
-<p:sld xmlns:p="http://schemas.openxmlformats.org/presentationml/2006/main" xmlns:a="http://schemas.openxmlformats.org/drawingml/2006/main" xmlns:r="http://schemas.openxmlformats.org/officeDocument/2006/relationships">
+<p:sld xmlns:a="http://schemas.openxmlformats.org/drawingml/2006/main" xmlns:r="http://schemas.openxmlformats.org/officeDocument/2006/relationships" xmlns:p="http://schemas.openxmlformats.org/presentationml/2006/main">
   <p:cSld>
     <p:bg>
       <p:bgPr>
         <a:solidFill>
           <a:srgbClr val="171717"/>
         </a:solidFill>
+        <a:effectLst/>
       </p:bgPr>
     </p:bg>
     <p:spTree>
@@ -5522,97 +4739,14 @@
           <a:chExt cx="0" cy="0"/>
         </a:xfrm>
       </p:grpSpPr>
-      <p:grpSp>
-        <p:nvGrpSpPr>
-          <p:cNvPr name="Group 2" id="2"/>
-          <p:cNvGrpSpPr/>
-          <p:nvPr/>
-        </p:nvGrpSpPr>
-        <p:grpSpPr>
-          <a:xfrm rot="0">
-            <a:off x="15859017" y="9529104"/>
-            <a:ext cx="1400283" cy="190500"/>
-            <a:chOff x="0" y="0"/>
-            <a:chExt cx="1867044" cy="254000"/>
-          </a:xfrm>
-        </p:grpSpPr>
-        <p:pic>
-          <p:nvPicPr>
-            <p:cNvPr name="Picture 3" id="3"/>
-            <p:cNvPicPr>
-              <a:picLocks noChangeAspect="true"/>
-            </p:cNvPicPr>
-            <p:nvPr/>
-          </p:nvPicPr>
-          <p:blipFill>
-            <a:blip r:embed="rId2">
-              <a:extLst>
-                <a:ext uri="{28A0092B-C50C-407E-A947-70E740481C1C}">
-                  <a14:useLocalDpi xmlns:a14="http://schemas.microsoft.com/office/drawing/2010/main" val="0"/>
-                </a:ext>
-                <a:ext uri="{96DAC541-7B7A-43D3-8B79-37D633B846F1}">
-                  <asvg:svgBlip xmlns:asvg="http://schemas.microsoft.com/office/drawing/2016/SVG/main" r:embed="rId3"/>
-                </a:ext>
-              </a:extLst>
-            </a:blip>
-            <a:srcRect l="0" t="0" r="0" b="0"/>
-            <a:stretch>
-              <a:fillRect/>
-            </a:stretch>
-          </p:blipFill>
-          <p:spPr>
-            <a:xfrm flipH="false" flipV="false" rot="0">
-              <a:off x="1292147" y="0"/>
-              <a:ext cx="574897" cy="254000"/>
-            </a:xfrm>
-            <a:prstGeom prst="rect">
-              <a:avLst/>
-            </a:prstGeom>
-          </p:spPr>
-        </p:pic>
-        <p:pic>
-          <p:nvPicPr>
-            <p:cNvPr name="Picture 4" id="4"/>
-            <p:cNvPicPr>
-              <a:picLocks noChangeAspect="true"/>
-            </p:cNvPicPr>
-            <p:nvPr/>
-          </p:nvPicPr>
-          <p:blipFill>
-            <a:blip r:embed="rId2">
-              <a:extLst>
-                <a:ext uri="{28A0092B-C50C-407E-A947-70E740481C1C}">
-                  <a14:useLocalDpi xmlns:a14="http://schemas.microsoft.com/office/drawing/2010/main" val="0"/>
-                </a:ext>
-                <a:ext uri="{96DAC541-7B7A-43D3-8B79-37D633B846F1}">
-                  <asvg:svgBlip xmlns:asvg="http://schemas.microsoft.com/office/drawing/2016/SVG/main" r:embed="rId3"/>
-                </a:ext>
-              </a:extLst>
-            </a:blip>
-            <a:srcRect l="0" t="0" r="0" b="0"/>
-            <a:stretch>
-              <a:fillRect/>
-            </a:stretch>
-          </p:blipFill>
-          <p:spPr>
-            <a:xfrm flipH="false" flipV="false" rot="-10800000">
-              <a:off x="0" y="0"/>
-              <a:ext cx="574897" cy="254000"/>
-            </a:xfrm>
-            <a:prstGeom prst="rect">
-              <a:avLst/>
-            </a:prstGeom>
-          </p:spPr>
-        </p:pic>
-      </p:grpSp>
-      <p:sp>
-        <p:nvSpPr>
-          <p:cNvPr name="AutoShape 5" id="5"/>
+      <p:sp>
+        <p:nvSpPr>
+          <p:cNvPr id="2" name="AutoShape 2"/>
           <p:cNvSpPr/>
           <p:nvPr/>
         </p:nvSpPr>
         <p:spPr>
-          <a:xfrm rot="0">
+          <a:xfrm>
             <a:off x="2248749" y="-108411"/>
             <a:ext cx="9525" cy="10503822"/>
           </a:xfrm>
@@ -5626,13 +4760,13 @@
       </p:sp>
       <p:sp>
         <p:nvSpPr>
-          <p:cNvPr name="AutoShape 6" id="6"/>
+          <p:cNvPr id="3" name="AutoShape 3"/>
           <p:cNvSpPr/>
           <p:nvPr/>
         </p:nvSpPr>
         <p:spPr>
-          <a:xfrm rot="0">
-            <a:off x="2258274" y="9058275"/>
+          <a:xfrm>
+            <a:off x="2248749" y="7834309"/>
             <a:ext cx="18288000" cy="9525"/>
           </a:xfrm>
           <a:prstGeom prst="rect">
@@ -5645,23 +4779,23 @@
       </p:sp>
       <p:pic>
         <p:nvPicPr>
-          <p:cNvPr name="Picture 7" id="7"/>
+          <p:cNvPr id="4" name="Picture 4"/>
           <p:cNvPicPr>
-            <a:picLocks noChangeAspect="true"/>
+            <a:picLocks noChangeAspect="1"/>
           </p:cNvPicPr>
           <p:nvPr/>
         </p:nvPicPr>
         <p:blipFill>
-          <a:blip r:embed="rId4"/>
-          <a:srcRect l="0" t="0" r="0" b="0"/>
+          <a:blip r:embed="rId2"/>
+          <a:srcRect/>
           <a:stretch>
             <a:fillRect/>
           </a:stretch>
         </p:blipFill>
         <p:spPr>
-          <a:xfrm flipH="false" flipV="false" rot="0">
-            <a:off x="2248749" y="689296"/>
-            <a:ext cx="15860042" cy="8276849"/>
+          <a:xfrm>
+            <a:off x="5207962" y="390096"/>
+            <a:ext cx="10215942" cy="6984062"/>
           </a:xfrm>
           <a:prstGeom prst="rect">
             <a:avLst/>
@@ -5670,12 +4804,12 @@
       </p:pic>
       <p:sp>
         <p:nvSpPr>
-          <p:cNvPr name="TextBox 8" id="8"/>
-          <p:cNvSpPr txBox="true"/>
+          <p:cNvPr id="5" name="TextBox 5"/>
+          <p:cNvSpPr txBox="1"/>
           <p:nvPr/>
         </p:nvSpPr>
         <p:spPr>
-          <a:xfrm rot="0">
+          <a:xfrm>
             <a:off x="2947264" y="3626857"/>
             <a:ext cx="3133468" cy="255270"/>
           </a:xfrm>
@@ -5684,7 +4818,7 @@
           </a:prstGeom>
         </p:spPr>
         <p:txBody>
-          <a:bodyPr anchor="t" rtlCol="false" tIns="0" lIns="0" bIns="0" rIns="0">
+          <a:bodyPr lIns="0" tIns="0" rIns="0" bIns="0" rtlCol="0" anchor="t">
             <a:spAutoFit/>
           </a:bodyPr>
           <a:lstStyle/>
@@ -5694,17 +4828,18 @@
                 <a:spcPts val="2160"/>
               </a:lnSpc>
             </a:pPr>
-          </a:p>
-        </p:txBody>
-      </p:sp>
-      <p:sp>
-        <p:nvSpPr>
-          <p:cNvPr name="TextBox 9" id="9"/>
-          <p:cNvSpPr txBox="true"/>
+            <a:endParaRPr/>
+          </a:p>
+        </p:txBody>
+      </p:sp>
+      <p:sp>
+        <p:nvSpPr>
+          <p:cNvPr id="6" name="TextBox 6"/>
+          <p:cNvSpPr txBox="1"/>
           <p:nvPr/>
         </p:nvSpPr>
         <p:spPr>
-          <a:xfrm rot="0">
+          <a:xfrm>
             <a:off x="6547453" y="4017382"/>
             <a:ext cx="3768480" cy="255270"/>
           </a:xfrm>
@@ -5713,7 +4848,7 @@
           </a:prstGeom>
         </p:spPr>
         <p:txBody>
-          <a:bodyPr anchor="t" rtlCol="false" tIns="0" lIns="0" bIns="0" rIns="0">
+          <a:bodyPr lIns="0" tIns="0" rIns="0" bIns="0" rtlCol="0" anchor="t">
             <a:spAutoFit/>
           </a:bodyPr>
           <a:lstStyle/>
@@ -5723,43 +4858,98 @@
                 <a:spcPts val="2160"/>
               </a:lnSpc>
             </a:pPr>
-          </a:p>
-        </p:txBody>
-      </p:sp>
-      <p:sp>
-        <p:nvSpPr>
-          <p:cNvPr name="TextBox 10" id="10"/>
-          <p:cNvSpPr txBox="true"/>
+            <a:endParaRPr/>
+          </a:p>
+        </p:txBody>
+      </p:sp>
+      <p:sp>
+        <p:nvSpPr>
+          <p:cNvPr id="7" name="TextBox 7"/>
+          <p:cNvSpPr txBox="1"/>
           <p:nvPr/>
         </p:nvSpPr>
         <p:spPr>
           <a:xfrm rot="-5400000">
-            <a:off x="-4115731" y="4241933"/>
-            <a:ext cx="10288863" cy="1171575"/>
+            <a:off x="-3861731" y="4200525"/>
+            <a:ext cx="9780863" cy="1885950"/>
           </a:xfrm>
           <a:prstGeom prst="rect">
             <a:avLst/>
           </a:prstGeom>
         </p:spPr>
         <p:txBody>
-          <a:bodyPr anchor="t" rtlCol="false" tIns="0" lIns="0" bIns="0" rIns="0">
+          <a:bodyPr lIns="0" tIns="0" rIns="0" bIns="0" rtlCol="0" anchor="t">
             <a:spAutoFit/>
           </a:bodyPr>
           <a:lstStyle/>
           <a:p>
-            <a:pPr>
+            <a:pPr algn="ctr">
               <a:lnSpc>
-                <a:spcPts val="9270"/>
+                <a:spcPts val="7470"/>
               </a:lnSpc>
             </a:pPr>
             <a:r>
-              <a:rPr lang="en-US" sz="7725">
+              <a:rPr lang="en-US" sz="6225" dirty="0">
                 <a:solidFill>
                   <a:srgbClr val="FFFFFF"/>
                 </a:solidFill>
                 <a:latin typeface="Big Shoulders Display Bold"/>
               </a:rPr>
-              <a:t>КОНВЕРТЕР ВАЛЮТ</a:t>
+              <a:t>ДИАГРАММА РАСХОДОВ И ДОХОДОВ</a:t>
+            </a:r>
+          </a:p>
+        </p:txBody>
+      </p:sp>
+      <p:sp>
+        <p:nvSpPr>
+          <p:cNvPr id="8" name="TextBox 8"/>
+          <p:cNvSpPr txBox="1"/>
+          <p:nvPr/>
+        </p:nvSpPr>
+        <p:spPr>
+          <a:xfrm>
+            <a:off x="2540826" y="8433752"/>
+            <a:ext cx="15550214" cy="1544321"/>
+          </a:xfrm>
+          <a:prstGeom prst="rect">
+            <a:avLst/>
+          </a:prstGeom>
+        </p:spPr>
+        <p:txBody>
+          <a:bodyPr lIns="0" tIns="0" rIns="0" bIns="0" rtlCol="0" anchor="t">
+            <a:spAutoFit/>
+          </a:bodyPr>
+          <a:lstStyle/>
+          <a:p>
+            <a:pPr>
+              <a:lnSpc>
+                <a:spcPts val="4159"/>
+              </a:lnSpc>
+            </a:pPr>
+            <a:r>
+              <a:rPr lang="en-US" sz="2599">
+                <a:solidFill>
+                  <a:srgbClr val="FFFFFF"/>
+                </a:solidFill>
+                <a:latin typeface="Lato"/>
+              </a:rPr>
+              <a:t>В диаграмме расходы и доходы сортируются по категориям. Добавить ту или иную операцию можно нажав на соответствующую кнопку в левой нижней части экрана.</a:t>
+            </a:r>
+          </a:p>
+          <a:p>
+            <a:pPr>
+              <a:lnSpc>
+                <a:spcPts val="4159"/>
+              </a:lnSpc>
+            </a:pPr>
+            <a:r>
+              <a:rPr lang="en-US" sz="2599">
+                <a:solidFill>
+                  <a:srgbClr val="FFFFFF"/>
+                </a:solidFill>
+                <a:latin typeface="Lato"/>
+              </a:rPr>
+              <a:t>В виджете под диаграммой отображаются все созданные категории операций вместе с их суммами.</a:t>
             </a:r>
           </a:p>
         </p:txBody>
@@ -5769,17 +4959,25 @@
   <p:clrMapOvr>
     <a:masterClrMapping/>
   </p:clrMapOvr>
+  <p:timing>
+    <p:tnLst>
+      <p:par>
+        <p:cTn id="1" dur="indefinite" restart="never" nodeType="tmRoot"/>
+      </p:par>
+    </p:tnLst>
+  </p:timing>
 </p:sld>
 </file>
 
 <file path=ppt/slides/slide7.xml><?xml version="1.0" encoding="utf-8"?>
-<p:sld xmlns:p="http://schemas.openxmlformats.org/presentationml/2006/main" xmlns:a="http://schemas.openxmlformats.org/drawingml/2006/main" xmlns:r="http://schemas.openxmlformats.org/officeDocument/2006/relationships">
+<p:sld xmlns:a="http://schemas.openxmlformats.org/drawingml/2006/main" xmlns:r="http://schemas.openxmlformats.org/officeDocument/2006/relationships" xmlns:p="http://schemas.openxmlformats.org/presentationml/2006/main">
   <p:cSld>
     <p:bg>
       <p:bgPr>
         <a:solidFill>
           <a:srgbClr val="171717"/>
         </a:solidFill>
+        <a:effectLst/>
       </p:bgPr>
     </p:bg>
     <p:spTree>
@@ -5796,97 +4994,14 @@
           <a:chExt cx="0" cy="0"/>
         </a:xfrm>
       </p:grpSpPr>
-      <p:grpSp>
-        <p:nvGrpSpPr>
-          <p:cNvPr name="Group 2" id="2"/>
-          <p:cNvGrpSpPr/>
-          <p:nvPr/>
-        </p:nvGrpSpPr>
-        <p:grpSpPr>
-          <a:xfrm rot="0">
-            <a:off x="15859017" y="9529104"/>
-            <a:ext cx="1400283" cy="190500"/>
-            <a:chOff x="0" y="0"/>
-            <a:chExt cx="1867044" cy="254000"/>
-          </a:xfrm>
-        </p:grpSpPr>
-        <p:pic>
-          <p:nvPicPr>
-            <p:cNvPr name="Picture 3" id="3"/>
-            <p:cNvPicPr>
-              <a:picLocks noChangeAspect="true"/>
-            </p:cNvPicPr>
-            <p:nvPr/>
-          </p:nvPicPr>
-          <p:blipFill>
-            <a:blip r:embed="rId2">
-              <a:extLst>
-                <a:ext uri="{28A0092B-C50C-407E-A947-70E740481C1C}">
-                  <a14:useLocalDpi xmlns:a14="http://schemas.microsoft.com/office/drawing/2010/main" val="0"/>
-                </a:ext>
-                <a:ext uri="{96DAC541-7B7A-43D3-8B79-37D633B846F1}">
-                  <asvg:svgBlip xmlns:asvg="http://schemas.microsoft.com/office/drawing/2016/SVG/main" r:embed="rId3"/>
-                </a:ext>
-              </a:extLst>
-            </a:blip>
-            <a:srcRect l="0" t="0" r="0" b="0"/>
-            <a:stretch>
-              <a:fillRect/>
-            </a:stretch>
-          </p:blipFill>
-          <p:spPr>
-            <a:xfrm flipH="false" flipV="false" rot="0">
-              <a:off x="1292147" y="0"/>
-              <a:ext cx="574897" cy="254000"/>
-            </a:xfrm>
-            <a:prstGeom prst="rect">
-              <a:avLst/>
-            </a:prstGeom>
-          </p:spPr>
-        </p:pic>
-        <p:pic>
-          <p:nvPicPr>
-            <p:cNvPr name="Picture 4" id="4"/>
-            <p:cNvPicPr>
-              <a:picLocks noChangeAspect="true"/>
-            </p:cNvPicPr>
-            <p:nvPr/>
-          </p:nvPicPr>
-          <p:blipFill>
-            <a:blip r:embed="rId2">
-              <a:extLst>
-                <a:ext uri="{28A0092B-C50C-407E-A947-70E740481C1C}">
-                  <a14:useLocalDpi xmlns:a14="http://schemas.microsoft.com/office/drawing/2010/main" val="0"/>
-                </a:ext>
-                <a:ext uri="{96DAC541-7B7A-43D3-8B79-37D633B846F1}">
-                  <asvg:svgBlip xmlns:asvg="http://schemas.microsoft.com/office/drawing/2016/SVG/main" r:embed="rId3"/>
-                </a:ext>
-              </a:extLst>
-            </a:blip>
-            <a:srcRect l="0" t="0" r="0" b="0"/>
-            <a:stretch>
-              <a:fillRect/>
-            </a:stretch>
-          </p:blipFill>
-          <p:spPr>
-            <a:xfrm flipH="false" flipV="false" rot="-10800000">
-              <a:off x="0" y="0"/>
-              <a:ext cx="574897" cy="254000"/>
-            </a:xfrm>
-            <a:prstGeom prst="rect">
-              <a:avLst/>
-            </a:prstGeom>
-          </p:spPr>
-        </p:pic>
-      </p:grpSp>
-      <p:sp>
-        <p:nvSpPr>
-          <p:cNvPr name="AutoShape 5" id="5"/>
+      <p:sp>
+        <p:nvSpPr>
+          <p:cNvPr id="2" name="AutoShape 2"/>
           <p:cNvSpPr/>
           <p:nvPr/>
         </p:nvSpPr>
         <p:spPr>
-          <a:xfrm rot="0">
+          <a:xfrm>
             <a:off x="2248749" y="-108411"/>
             <a:ext cx="9525" cy="10503822"/>
           </a:xfrm>
@@ -5900,13 +5015,13 @@
       </p:sp>
       <p:sp>
         <p:nvSpPr>
-          <p:cNvPr name="AutoShape 6" id="6"/>
+          <p:cNvPr id="3" name="AutoShape 3"/>
           <p:cNvSpPr/>
           <p:nvPr/>
         </p:nvSpPr>
         <p:spPr>
-          <a:xfrm rot="0">
-            <a:off x="2258274" y="9058275"/>
+          <a:xfrm>
+            <a:off x="2258274" y="7892593"/>
             <a:ext cx="18288000" cy="9525"/>
           </a:xfrm>
           <a:prstGeom prst="rect">
@@ -5919,46 +5034,71 @@
       </p:sp>
       <p:pic>
         <p:nvPicPr>
-          <p:cNvPr name="Picture 7" id="7"/>
+          <p:cNvPr id="4" name="Picture 4"/>
           <p:cNvPicPr>
-            <a:picLocks noChangeAspect="true"/>
+            <a:picLocks noChangeAspect="1"/>
           </p:cNvPicPr>
           <p:nvPr/>
         </p:nvPicPr>
         <p:blipFill>
-          <a:blip r:embed="rId4"/>
-          <a:srcRect l="1290" t="0" r="0" b="0"/>
+          <a:blip r:embed="rId2"/>
+          <a:srcRect/>
           <a:stretch>
             <a:fillRect/>
           </a:stretch>
         </p:blipFill>
         <p:spPr>
-          <a:xfrm flipH="false" flipV="false" rot="0">
-            <a:off x="2452743" y="828675"/>
-            <a:ext cx="15597387" cy="8239125"/>
+          <a:xfrm>
+            <a:off x="10510323" y="874895"/>
+            <a:ext cx="7370382" cy="6014464"/>
           </a:xfrm>
           <a:prstGeom prst="rect">
             <a:avLst/>
           </a:prstGeom>
         </p:spPr>
       </p:pic>
-      <p:sp>
-        <p:nvSpPr>
-          <p:cNvPr name="TextBox 8" id="8"/>
-          <p:cNvSpPr txBox="true"/>
+      <p:pic>
+        <p:nvPicPr>
+          <p:cNvPr id="5" name="Picture 5"/>
+          <p:cNvPicPr>
+            <a:picLocks noChangeAspect="1"/>
+          </p:cNvPicPr>
           <p:nvPr/>
-        </p:nvSpPr>
-        <p:spPr>
-          <a:xfrm rot="0">
-            <a:off x="2947264" y="3626857"/>
-            <a:ext cx="3133468" cy="255270"/>
+        </p:nvPicPr>
+        <p:blipFill>
+          <a:blip r:embed="rId3"/>
+          <a:srcRect/>
+          <a:stretch>
+            <a:fillRect/>
+          </a:stretch>
+        </p:blipFill>
+        <p:spPr>
+          <a:xfrm>
+            <a:off x="2528975" y="831886"/>
+            <a:ext cx="7544217" cy="5902363"/>
           </a:xfrm>
           <a:prstGeom prst="rect">
             <a:avLst/>
           </a:prstGeom>
         </p:spPr>
-        <p:txBody>
-          <a:bodyPr anchor="t" rtlCol="false" tIns="0" lIns="0" bIns="0" rIns="0">
+      </p:pic>
+      <p:sp>
+        <p:nvSpPr>
+          <p:cNvPr id="6" name="TextBox 6"/>
+          <p:cNvSpPr txBox="1"/>
+          <p:nvPr/>
+        </p:nvSpPr>
+        <p:spPr>
+          <a:xfrm>
+            <a:off x="2947264" y="3626857"/>
+            <a:ext cx="3133468" cy="255270"/>
+          </a:xfrm>
+          <a:prstGeom prst="rect">
+            <a:avLst/>
+          </a:prstGeom>
+        </p:spPr>
+        <p:txBody>
+          <a:bodyPr lIns="0" tIns="0" rIns="0" bIns="0" rtlCol="0" anchor="t">
             <a:spAutoFit/>
           </a:bodyPr>
           <a:lstStyle/>
@@ -5968,72 +5108,114 @@
                 <a:spcPts val="2160"/>
               </a:lnSpc>
             </a:pPr>
-          </a:p>
-        </p:txBody>
-      </p:sp>
-      <p:sp>
-        <p:nvSpPr>
-          <p:cNvPr name="TextBox 9" id="9"/>
-          <p:cNvSpPr txBox="true"/>
+            <a:endParaRPr/>
+          </a:p>
+        </p:txBody>
+      </p:sp>
+      <p:sp>
+        <p:nvSpPr>
+          <p:cNvPr id="7" name="TextBox 7"/>
+          <p:cNvSpPr txBox="1"/>
           <p:nvPr/>
         </p:nvSpPr>
         <p:spPr>
-          <a:xfrm rot="0">
-            <a:off x="6547453" y="4017382"/>
-            <a:ext cx="3768480" cy="255270"/>
+          <a:xfrm rot="-5400000">
+            <a:off x="-4333219" y="4672012"/>
+            <a:ext cx="9780863" cy="942975"/>
           </a:xfrm>
           <a:prstGeom prst="rect">
             <a:avLst/>
           </a:prstGeom>
         </p:spPr>
         <p:txBody>
-          <a:bodyPr anchor="t" rtlCol="false" tIns="0" lIns="0" bIns="0" rIns="0">
+          <a:bodyPr lIns="0" tIns="0" rIns="0" bIns="0" rtlCol="0" anchor="t">
             <a:spAutoFit/>
           </a:bodyPr>
           <a:lstStyle/>
           <a:p>
-            <a:pPr>
+            <a:pPr algn="ctr">
               <a:lnSpc>
-                <a:spcPts val="2160"/>
+                <a:spcPts val="7470"/>
               </a:lnSpc>
             </a:pPr>
-          </a:p>
-        </p:txBody>
-      </p:sp>
-      <p:sp>
-        <p:nvSpPr>
-          <p:cNvPr name="TextBox 10" id="10"/>
-          <p:cNvSpPr txBox="true"/>
-          <p:nvPr/>
-        </p:nvSpPr>
-        <p:spPr>
-          <a:xfrm rot="-5400000">
-            <a:off x="-2290106" y="4557712"/>
-            <a:ext cx="6637613" cy="1171575"/>
-          </a:xfrm>
-          <a:prstGeom prst="rect">
-            <a:avLst/>
-          </a:prstGeom>
-        </p:spPr>
-        <p:txBody>
-          <a:bodyPr anchor="t" rtlCol="false" tIns="0" lIns="0" bIns="0" rIns="0">
-            <a:spAutoFit/>
-          </a:bodyPr>
-          <a:lstStyle/>
-          <a:p>
-            <a:pPr>
-              <a:lnSpc>
-                <a:spcPts val="9270"/>
-              </a:lnSpc>
-            </a:pPr>
-            <a:r>
-              <a:rPr lang="en-US" sz="7725">
+            <a:r>
+              <a:rPr lang="en-US" sz="6225" dirty="0">
                 <a:solidFill>
                   <a:srgbClr val="FFFFFF"/>
                 </a:solidFill>
                 <a:latin typeface="Big Shoulders Display Bold"/>
               </a:rPr>
-              <a:t>КУРС ВАЛЮТ</a:t>
+              <a:t>РЕГУЛЯРНЫЕ ПЛАТЕЖИ</a:t>
+            </a:r>
+          </a:p>
+        </p:txBody>
+      </p:sp>
+      <p:sp>
+        <p:nvSpPr>
+          <p:cNvPr id="8" name="TextBox 8"/>
+          <p:cNvSpPr txBox="1"/>
+          <p:nvPr/>
+        </p:nvSpPr>
+        <p:spPr>
+          <a:xfrm>
+            <a:off x="2947264" y="7965735"/>
+            <a:ext cx="14933442" cy="2068196"/>
+          </a:xfrm>
+          <a:prstGeom prst="rect">
+            <a:avLst/>
+          </a:prstGeom>
+        </p:spPr>
+        <p:txBody>
+          <a:bodyPr lIns="0" tIns="0" rIns="0" bIns="0" rtlCol="0" anchor="t">
+            <a:spAutoFit/>
+          </a:bodyPr>
+          <a:lstStyle/>
+          <a:p>
+            <a:pPr>
+              <a:lnSpc>
+                <a:spcPts val="4159"/>
+              </a:lnSpc>
+            </a:pPr>
+            <a:r>
+              <a:rPr lang="en-US" sz="2599">
+                <a:solidFill>
+                  <a:srgbClr val="FFFFFF"/>
+                </a:solidFill>
+                <a:latin typeface="Lato"/>
+              </a:rPr>
+              <a:t>Регулярные платежи позволяют добавить платеж, который будет списываться или зачисляться с заданной периодичностью. </a:t>
+            </a:r>
+          </a:p>
+          <a:p>
+            <a:pPr>
+              <a:lnSpc>
+                <a:spcPts val="4159"/>
+              </a:lnSpc>
+            </a:pPr>
+            <a:r>
+              <a:rPr lang="en-US" sz="2599">
+                <a:solidFill>
+                  <a:srgbClr val="FFFFFF"/>
+                </a:solidFill>
+                <a:latin typeface="Lato"/>
+              </a:rPr>
+              <a:t>Кроме создания, есть возможность удалить уже существующий платеж. </a:t>
+            </a:r>
+          </a:p>
+          <a:p>
+            <a:pPr>
+              <a:lnSpc>
+                <a:spcPts val="4159"/>
+              </a:lnSpc>
+            </a:pPr>
+            <a:r>
+              <a:rPr lang="en-US" sz="2599">
+                <a:solidFill>
+                  <a:srgbClr val="FFFFFF"/>
+                </a:solidFill>
+                <a:latin typeface="Lato"/>
+              </a:rPr>
+              <a:t>Все данные сохраняются в таблице базы данных.</a:t>
             </a:r>
           </a:p>
         </p:txBody>
@@ -6043,17 +5225,25 @@
   <p:clrMapOvr>
     <a:masterClrMapping/>
   </p:clrMapOvr>
+  <p:timing>
+    <p:tnLst>
+      <p:par>
+        <p:cTn id="1" dur="indefinite" restart="never" nodeType="tmRoot"/>
+      </p:par>
+    </p:tnLst>
+  </p:timing>
 </p:sld>
 </file>
 
 <file path=ppt/slides/slide8.xml><?xml version="1.0" encoding="utf-8"?>
-<p:sld xmlns:p="http://schemas.openxmlformats.org/presentationml/2006/main" xmlns:a="http://schemas.openxmlformats.org/drawingml/2006/main" xmlns:r="http://schemas.openxmlformats.org/officeDocument/2006/relationships">
+<p:sld xmlns:a="http://schemas.openxmlformats.org/drawingml/2006/main" xmlns:r="http://schemas.openxmlformats.org/officeDocument/2006/relationships" xmlns:p="http://schemas.openxmlformats.org/presentationml/2006/main">
   <p:cSld>
     <p:bg>
       <p:bgPr>
         <a:solidFill>
           <a:srgbClr val="171717"/>
         </a:solidFill>
+        <a:effectLst/>
       </p:bgPr>
     </p:bg>
     <p:spTree>
@@ -6070,97 +5260,14 @@
           <a:chExt cx="0" cy="0"/>
         </a:xfrm>
       </p:grpSpPr>
-      <p:grpSp>
-        <p:nvGrpSpPr>
-          <p:cNvPr name="Group 2" id="2"/>
-          <p:cNvGrpSpPr/>
-          <p:nvPr/>
-        </p:nvGrpSpPr>
-        <p:grpSpPr>
-          <a:xfrm rot="0">
-            <a:off x="15859017" y="9529104"/>
-            <a:ext cx="1400283" cy="190500"/>
-            <a:chOff x="0" y="0"/>
-            <a:chExt cx="1867044" cy="254000"/>
-          </a:xfrm>
-        </p:grpSpPr>
-        <p:pic>
-          <p:nvPicPr>
-            <p:cNvPr name="Picture 3" id="3"/>
-            <p:cNvPicPr>
-              <a:picLocks noChangeAspect="true"/>
-            </p:cNvPicPr>
-            <p:nvPr/>
-          </p:nvPicPr>
-          <p:blipFill>
-            <a:blip r:embed="rId2">
-              <a:extLst>
-                <a:ext uri="{28A0092B-C50C-407E-A947-70E740481C1C}">
-                  <a14:useLocalDpi xmlns:a14="http://schemas.microsoft.com/office/drawing/2010/main" val="0"/>
-                </a:ext>
-                <a:ext uri="{96DAC541-7B7A-43D3-8B79-37D633B846F1}">
-                  <asvg:svgBlip xmlns:asvg="http://schemas.microsoft.com/office/drawing/2016/SVG/main" r:embed="rId3"/>
-                </a:ext>
-              </a:extLst>
-            </a:blip>
-            <a:srcRect l="0" t="0" r="0" b="0"/>
-            <a:stretch>
-              <a:fillRect/>
-            </a:stretch>
-          </p:blipFill>
-          <p:spPr>
-            <a:xfrm flipH="false" flipV="false" rot="0">
-              <a:off x="1292147" y="0"/>
-              <a:ext cx="574897" cy="254000"/>
-            </a:xfrm>
-            <a:prstGeom prst="rect">
-              <a:avLst/>
-            </a:prstGeom>
-          </p:spPr>
-        </p:pic>
-        <p:pic>
-          <p:nvPicPr>
-            <p:cNvPr name="Picture 4" id="4"/>
-            <p:cNvPicPr>
-              <a:picLocks noChangeAspect="true"/>
-            </p:cNvPicPr>
-            <p:nvPr/>
-          </p:nvPicPr>
-          <p:blipFill>
-            <a:blip r:embed="rId2">
-              <a:extLst>
-                <a:ext uri="{28A0092B-C50C-407E-A947-70E740481C1C}">
-                  <a14:useLocalDpi xmlns:a14="http://schemas.microsoft.com/office/drawing/2010/main" val="0"/>
-                </a:ext>
-                <a:ext uri="{96DAC541-7B7A-43D3-8B79-37D633B846F1}">
-                  <asvg:svgBlip xmlns:asvg="http://schemas.microsoft.com/office/drawing/2016/SVG/main" r:embed="rId3"/>
-                </a:ext>
-              </a:extLst>
-            </a:blip>
-            <a:srcRect l="0" t="0" r="0" b="0"/>
-            <a:stretch>
-              <a:fillRect/>
-            </a:stretch>
-          </p:blipFill>
-          <p:spPr>
-            <a:xfrm flipH="false" flipV="false" rot="-10800000">
-              <a:off x="0" y="0"/>
-              <a:ext cx="574897" cy="254000"/>
-            </a:xfrm>
-            <a:prstGeom prst="rect">
-              <a:avLst/>
-            </a:prstGeom>
-          </p:spPr>
-        </p:pic>
-      </p:grpSp>
-      <p:sp>
-        <p:nvSpPr>
-          <p:cNvPr name="AutoShape 5" id="5"/>
+      <p:sp>
+        <p:nvSpPr>
+          <p:cNvPr id="2" name="AutoShape 2"/>
           <p:cNvSpPr/>
           <p:nvPr/>
         </p:nvSpPr>
         <p:spPr>
-          <a:xfrm rot="0">
+          <a:xfrm>
             <a:off x="2248749" y="-108411"/>
             <a:ext cx="9525" cy="10503822"/>
           </a:xfrm>
@@ -6174,13 +5281,13 @@
       </p:sp>
       <p:sp>
         <p:nvSpPr>
-          <p:cNvPr name="AutoShape 6" id="6"/>
+          <p:cNvPr id="3" name="AutoShape 3"/>
           <p:cNvSpPr/>
           <p:nvPr/>
         </p:nvSpPr>
         <p:spPr>
-          <a:xfrm rot="0">
-            <a:off x="2258274" y="9058275"/>
+          <a:xfrm>
+            <a:off x="2258274" y="8096587"/>
             <a:ext cx="18288000" cy="9525"/>
           </a:xfrm>
           <a:prstGeom prst="rect">
@@ -6191,23 +5298,48 @@
           </a:solidFill>
         </p:spPr>
       </p:sp>
-      <p:sp>
-        <p:nvSpPr>
-          <p:cNvPr name="TextBox 7" id="7"/>
-          <p:cNvSpPr txBox="true"/>
+      <p:pic>
+        <p:nvPicPr>
+          <p:cNvPr id="4" name="Picture 4"/>
+          <p:cNvPicPr>
+            <a:picLocks noChangeAspect="1"/>
+          </p:cNvPicPr>
           <p:nvPr/>
-        </p:nvSpPr>
-        <p:spPr>
-          <a:xfrm rot="0">
-            <a:off x="2947264" y="3626857"/>
-            <a:ext cx="3133468" cy="255270"/>
+        </p:nvPicPr>
+        <p:blipFill>
+          <a:blip r:embed="rId2"/>
+          <a:srcRect/>
+          <a:stretch>
+            <a:fillRect/>
+          </a:stretch>
+        </p:blipFill>
+        <p:spPr>
+          <a:xfrm>
+            <a:off x="4572746" y="480809"/>
+            <a:ext cx="11486374" cy="7187446"/>
           </a:xfrm>
           <a:prstGeom prst="rect">
             <a:avLst/>
           </a:prstGeom>
         </p:spPr>
-        <p:txBody>
-          <a:bodyPr anchor="t" rtlCol="false" tIns="0" lIns="0" bIns="0" rIns="0">
+      </p:pic>
+      <p:sp>
+        <p:nvSpPr>
+          <p:cNvPr id="5" name="TextBox 5"/>
+          <p:cNvSpPr txBox="1"/>
+          <p:nvPr/>
+        </p:nvSpPr>
+        <p:spPr>
+          <a:xfrm>
+            <a:off x="6547453" y="4017382"/>
+            <a:ext cx="3768480" cy="255270"/>
+          </a:xfrm>
+          <a:prstGeom prst="rect">
+            <a:avLst/>
+          </a:prstGeom>
+        </p:spPr>
+        <p:txBody>
+          <a:bodyPr lIns="0" tIns="0" rIns="0" bIns="0" rtlCol="0" anchor="t">
             <a:spAutoFit/>
           </a:bodyPr>
           <a:lstStyle/>
@@ -6217,73 +5349,96 @@
                 <a:spcPts val="2160"/>
               </a:lnSpc>
             </a:pPr>
-          </a:p>
-        </p:txBody>
-      </p:sp>
-      <p:sp>
-        <p:nvSpPr>
-          <p:cNvPr name="TextBox 8" id="8"/>
-          <p:cNvSpPr txBox="true"/>
+            <a:endParaRPr/>
+          </a:p>
+        </p:txBody>
+      </p:sp>
+      <p:sp>
+        <p:nvSpPr>
+          <p:cNvPr id="6" name="TextBox 6"/>
+          <p:cNvSpPr txBox="1"/>
           <p:nvPr/>
         </p:nvSpPr>
         <p:spPr>
-          <a:xfrm rot="0">
-            <a:off x="6547453" y="4017382"/>
-            <a:ext cx="3768480" cy="255270"/>
+          <a:xfrm rot="-5400000">
+            <a:off x="-4115731" y="4288470"/>
+            <a:ext cx="10288863" cy="1078500"/>
           </a:xfrm>
           <a:prstGeom prst="rect">
             <a:avLst/>
           </a:prstGeom>
         </p:spPr>
         <p:txBody>
-          <a:bodyPr anchor="t" rtlCol="false" tIns="0" lIns="0" bIns="0" rIns="0">
+          <a:bodyPr lIns="0" tIns="0" rIns="0" bIns="0" rtlCol="0" anchor="t">
             <a:spAutoFit/>
           </a:bodyPr>
           <a:lstStyle/>
           <a:p>
-            <a:pPr>
+            <a:pPr algn="ctr">
               <a:lnSpc>
-                <a:spcPts val="2160"/>
+                <a:spcPts val="9270"/>
               </a:lnSpc>
             </a:pPr>
-          </a:p>
-        </p:txBody>
-      </p:sp>
-      <p:sp>
-        <p:nvSpPr>
-          <p:cNvPr name="TextBox 9" id="9"/>
-          <p:cNvSpPr txBox="true"/>
-          <p:nvPr/>
-        </p:nvSpPr>
-        <p:spPr>
-          <a:xfrm rot="-5400000">
-            <a:off x="-3861731" y="4200525"/>
-            <a:ext cx="9780863" cy="1885950"/>
-          </a:xfrm>
-          <a:prstGeom prst="rect">
-            <a:avLst/>
-          </a:prstGeom>
-        </p:spPr>
-        <p:txBody>
-          <a:bodyPr anchor="t" rtlCol="false" tIns="0" lIns="0" bIns="0" rIns="0">
-            <a:spAutoFit/>
-          </a:bodyPr>
-          <a:lstStyle/>
-          <a:p>
-            <a:pPr algn="ctr">
-              <a:lnSpc>
-                <a:spcPts val="7470"/>
-              </a:lnSpc>
-            </a:pPr>
-            <a:r>
-              <a:rPr lang="en-US" sz="6225">
+            <a:r>
+              <a:rPr lang="en-US" sz="6230" dirty="0">
                 <a:solidFill>
                   <a:srgbClr val="FFFFFF"/>
                 </a:solidFill>
                 <a:latin typeface="Big Shoulders Display Bold"/>
               </a:rPr>
-              <a:t>ДИАГРАММА РАСХОДОВ И ДОХОДОВ</a:t>
-            </a:r>
+              <a:t>КОНВЕРТЕР ВАЛЮТ</a:t>
+            </a:r>
+          </a:p>
+        </p:txBody>
+      </p:sp>
+      <p:sp>
+        <p:nvSpPr>
+          <p:cNvPr id="7" name="TextBox 7"/>
+          <p:cNvSpPr txBox="1"/>
+          <p:nvPr/>
+        </p:nvSpPr>
+        <p:spPr>
+          <a:xfrm>
+            <a:off x="3531655" y="8427831"/>
+            <a:ext cx="13568555" cy="1544321"/>
+          </a:xfrm>
+          <a:prstGeom prst="rect">
+            <a:avLst/>
+          </a:prstGeom>
+        </p:spPr>
+        <p:txBody>
+          <a:bodyPr lIns="0" tIns="0" rIns="0" bIns="0" rtlCol="0" anchor="t">
+            <a:spAutoFit/>
+          </a:bodyPr>
+          <a:lstStyle/>
+          <a:p>
+            <a:pPr>
+              <a:lnSpc>
+                <a:spcPts val="4159"/>
+              </a:lnSpc>
+            </a:pPr>
+            <a:r>
+              <a:rPr lang="en-US" sz="2599">
+                <a:solidFill>
+                  <a:srgbClr val="FFFFFF"/>
+                </a:solidFill>
+                <a:latin typeface="Lato"/>
+              </a:rPr>
+              <a:t>Конвертер осуществляет конвертацию валют в соответствии с курсом на сегодняшний день. Данные валют берутся с сервиса European Central Bank.</a:t>
+            </a:r>
+          </a:p>
+          <a:p>
+            <a:pPr>
+              <a:lnSpc>
+                <a:spcPts val="4159"/>
+              </a:lnSpc>
+            </a:pPr>
+            <a:endParaRPr lang="en-US" sz="2599">
+              <a:solidFill>
+                <a:srgbClr val="FFFFFF"/>
+              </a:solidFill>
+              <a:latin typeface="Lato"/>
+            </a:endParaRPr>
           </a:p>
         </p:txBody>
       </p:sp>
@@ -6292,17 +5447,25 @@
   <p:clrMapOvr>
     <a:masterClrMapping/>
   </p:clrMapOvr>
+  <p:timing>
+    <p:tnLst>
+      <p:par>
+        <p:cTn id="1" dur="indefinite" restart="never" nodeType="tmRoot"/>
+      </p:par>
+    </p:tnLst>
+  </p:timing>
 </p:sld>
 </file>
 
 <file path=ppt/slides/slide9.xml><?xml version="1.0" encoding="utf-8"?>
-<p:sld xmlns:p="http://schemas.openxmlformats.org/presentationml/2006/main" xmlns:a="http://schemas.openxmlformats.org/drawingml/2006/main" xmlns:r="http://schemas.openxmlformats.org/officeDocument/2006/relationships">
+<p:sld xmlns:a="http://schemas.openxmlformats.org/drawingml/2006/main" xmlns:r="http://schemas.openxmlformats.org/officeDocument/2006/relationships" xmlns:p="http://schemas.openxmlformats.org/presentationml/2006/main">
   <p:cSld>
     <p:bg>
       <p:bgPr>
         <a:solidFill>
           <a:srgbClr val="171717"/>
         </a:solidFill>
+        <a:effectLst/>
       </p:bgPr>
     </p:bg>
     <p:spTree>
@@ -6319,97 +5482,14 @@
           <a:chExt cx="0" cy="0"/>
         </a:xfrm>
       </p:grpSpPr>
-      <p:grpSp>
-        <p:nvGrpSpPr>
-          <p:cNvPr name="Group 2" id="2"/>
-          <p:cNvGrpSpPr/>
-          <p:nvPr/>
-        </p:nvGrpSpPr>
-        <p:grpSpPr>
-          <a:xfrm rot="0">
-            <a:off x="15859017" y="9529104"/>
-            <a:ext cx="1400283" cy="190500"/>
-            <a:chOff x="0" y="0"/>
-            <a:chExt cx="1867044" cy="254000"/>
-          </a:xfrm>
-        </p:grpSpPr>
-        <p:pic>
-          <p:nvPicPr>
-            <p:cNvPr name="Picture 3" id="3"/>
-            <p:cNvPicPr>
-              <a:picLocks noChangeAspect="true"/>
-            </p:cNvPicPr>
-            <p:nvPr/>
-          </p:nvPicPr>
-          <p:blipFill>
-            <a:blip r:embed="rId2">
-              <a:extLst>
-                <a:ext uri="{28A0092B-C50C-407E-A947-70E740481C1C}">
-                  <a14:useLocalDpi xmlns:a14="http://schemas.microsoft.com/office/drawing/2010/main" val="0"/>
-                </a:ext>
-                <a:ext uri="{96DAC541-7B7A-43D3-8B79-37D633B846F1}">
-                  <asvg:svgBlip xmlns:asvg="http://schemas.microsoft.com/office/drawing/2016/SVG/main" r:embed="rId3"/>
-                </a:ext>
-              </a:extLst>
-            </a:blip>
-            <a:srcRect l="0" t="0" r="0" b="0"/>
-            <a:stretch>
-              <a:fillRect/>
-            </a:stretch>
-          </p:blipFill>
-          <p:spPr>
-            <a:xfrm flipH="false" flipV="false" rot="0">
-              <a:off x="1292147" y="0"/>
-              <a:ext cx="574897" cy="254000"/>
-            </a:xfrm>
-            <a:prstGeom prst="rect">
-              <a:avLst/>
-            </a:prstGeom>
-          </p:spPr>
-        </p:pic>
-        <p:pic>
-          <p:nvPicPr>
-            <p:cNvPr name="Picture 4" id="4"/>
-            <p:cNvPicPr>
-              <a:picLocks noChangeAspect="true"/>
-            </p:cNvPicPr>
-            <p:nvPr/>
-          </p:nvPicPr>
-          <p:blipFill>
-            <a:blip r:embed="rId2">
-              <a:extLst>
-                <a:ext uri="{28A0092B-C50C-407E-A947-70E740481C1C}">
-                  <a14:useLocalDpi xmlns:a14="http://schemas.microsoft.com/office/drawing/2010/main" val="0"/>
-                </a:ext>
-                <a:ext uri="{96DAC541-7B7A-43D3-8B79-37D633B846F1}">
-                  <asvg:svgBlip xmlns:asvg="http://schemas.microsoft.com/office/drawing/2016/SVG/main" r:embed="rId3"/>
-                </a:ext>
-              </a:extLst>
-            </a:blip>
-            <a:srcRect l="0" t="0" r="0" b="0"/>
-            <a:stretch>
-              <a:fillRect/>
-            </a:stretch>
-          </p:blipFill>
-          <p:spPr>
-            <a:xfrm flipH="false" flipV="false" rot="-10800000">
-              <a:off x="0" y="0"/>
-              <a:ext cx="574897" cy="254000"/>
-            </a:xfrm>
-            <a:prstGeom prst="rect">
-              <a:avLst/>
-            </a:prstGeom>
-          </p:spPr>
-        </p:pic>
-      </p:grpSp>
-      <p:sp>
-        <p:nvSpPr>
-          <p:cNvPr name="AutoShape 5" id="5"/>
+      <p:sp>
+        <p:nvSpPr>
+          <p:cNvPr id="2" name="AutoShape 2"/>
           <p:cNvSpPr/>
           <p:nvPr/>
         </p:nvSpPr>
         <p:spPr>
-          <a:xfrm rot="0">
+          <a:xfrm>
             <a:off x="2248749" y="-108411"/>
             <a:ext cx="9525" cy="10503822"/>
           </a:xfrm>
@@ -6423,13 +5503,13 @@
       </p:sp>
       <p:sp>
         <p:nvSpPr>
-          <p:cNvPr name="AutoShape 6" id="6"/>
+          <p:cNvPr id="3" name="AutoShape 3"/>
           <p:cNvSpPr/>
           <p:nvPr/>
         </p:nvSpPr>
         <p:spPr>
-          <a:xfrm rot="0">
-            <a:off x="2258274" y="9058275"/>
+          <a:xfrm>
+            <a:off x="2258274" y="7995303"/>
             <a:ext cx="18288000" cy="9525"/>
           </a:xfrm>
           <a:prstGeom prst="rect">
@@ -6442,71 +5522,46 @@
       </p:sp>
       <p:pic>
         <p:nvPicPr>
-          <p:cNvPr name="Picture 7" id="7"/>
+          <p:cNvPr id="4" name="Picture 4"/>
           <p:cNvPicPr>
-            <a:picLocks noChangeAspect="true"/>
+            <a:picLocks noChangeAspect="1"/>
           </p:cNvPicPr>
           <p:nvPr/>
         </p:nvPicPr>
         <p:blipFill>
-          <a:blip r:embed="rId4"/>
-          <a:srcRect l="474" t="0" r="474" b="0"/>
+          <a:blip r:embed="rId2"/>
+          <a:srcRect/>
           <a:stretch>
             <a:fillRect/>
           </a:stretch>
         </p:blipFill>
         <p:spPr>
-          <a:xfrm flipH="false" flipV="false" rot="0">
-            <a:off x="2896745" y="2074524"/>
-            <a:ext cx="6247255" cy="6137953"/>
+          <a:xfrm>
+            <a:off x="4513998" y="424459"/>
+            <a:ext cx="11221370" cy="7381609"/>
           </a:xfrm>
           <a:prstGeom prst="rect">
             <a:avLst/>
           </a:prstGeom>
         </p:spPr>
       </p:pic>
-      <p:pic>
-        <p:nvPicPr>
-          <p:cNvPr name="Picture 8" id="8"/>
-          <p:cNvPicPr>
-            <a:picLocks noChangeAspect="true"/>
-          </p:cNvPicPr>
+      <p:sp>
+        <p:nvSpPr>
+          <p:cNvPr id="5" name="TextBox 5"/>
+          <p:cNvSpPr txBox="1"/>
           <p:nvPr/>
-        </p:nvPicPr>
-        <p:blipFill>
-          <a:blip r:embed="rId5"/>
-          <a:srcRect l="1005" t="0" r="1005" b="0"/>
-          <a:stretch>
-            <a:fillRect/>
-          </a:stretch>
-        </p:blipFill>
-        <p:spPr>
-          <a:xfrm flipH="false" flipV="false" rot="0">
-            <a:off x="10105688" y="2074524"/>
-            <a:ext cx="7370382" cy="6137953"/>
+        </p:nvSpPr>
+        <p:spPr>
+          <a:xfrm>
+            <a:off x="2947264" y="3626857"/>
+            <a:ext cx="3133468" cy="255270"/>
           </a:xfrm>
           <a:prstGeom prst="rect">
             <a:avLst/>
           </a:prstGeom>
         </p:spPr>
-      </p:pic>
-      <p:sp>
-        <p:nvSpPr>
-          <p:cNvPr name="TextBox 9" id="9"/>
-          <p:cNvSpPr txBox="true"/>
-          <p:nvPr/>
-        </p:nvSpPr>
-        <p:spPr>
-          <a:xfrm rot="0">
-            <a:off x="2947264" y="3626857"/>
-            <a:ext cx="3133468" cy="255270"/>
-          </a:xfrm>
-          <a:prstGeom prst="rect">
-            <a:avLst/>
-          </a:prstGeom>
-        </p:spPr>
-        <p:txBody>
-          <a:bodyPr anchor="t" rtlCol="false" tIns="0" lIns="0" bIns="0" rIns="0">
+        <p:txBody>
+          <a:bodyPr lIns="0" tIns="0" rIns="0" bIns="0" rtlCol="0" anchor="t">
             <a:spAutoFit/>
           </a:bodyPr>
           <a:lstStyle/>
@@ -6516,43 +5571,88 @@
                 <a:spcPts val="2160"/>
               </a:lnSpc>
             </a:pPr>
-          </a:p>
-        </p:txBody>
-      </p:sp>
-      <p:sp>
-        <p:nvSpPr>
-          <p:cNvPr name="TextBox 10" id="10"/>
-          <p:cNvSpPr txBox="true"/>
+            <a:endParaRPr/>
+          </a:p>
+        </p:txBody>
+      </p:sp>
+      <p:sp>
+        <p:nvSpPr>
+          <p:cNvPr id="6" name="TextBox 6"/>
+          <p:cNvSpPr txBox="1"/>
           <p:nvPr/>
         </p:nvSpPr>
         <p:spPr>
           <a:xfrm rot="-5400000">
-            <a:off x="-4333219" y="4672012"/>
-            <a:ext cx="9780863" cy="942975"/>
+            <a:off x="-2290106" y="4582159"/>
+            <a:ext cx="6637613" cy="1122680"/>
           </a:xfrm>
           <a:prstGeom prst="rect">
             <a:avLst/>
           </a:prstGeom>
         </p:spPr>
         <p:txBody>
-          <a:bodyPr anchor="t" rtlCol="false" tIns="0" lIns="0" bIns="0" rIns="0">
+          <a:bodyPr lIns="0" tIns="0" rIns="0" bIns="0" rtlCol="0" anchor="t">
             <a:spAutoFit/>
           </a:bodyPr>
           <a:lstStyle/>
           <a:p>
             <a:pPr algn="ctr">
               <a:lnSpc>
-                <a:spcPts val="7470"/>
+                <a:spcPts val="9270"/>
               </a:lnSpc>
             </a:pPr>
             <a:r>
-              <a:rPr lang="en-US" sz="6225">
+              <a:rPr lang="en-US" sz="7725" dirty="0" smtClean="0">
                 <a:solidFill>
                   <a:srgbClr val="FFFFFF"/>
                 </a:solidFill>
                 <a:latin typeface="Big Shoulders Display Bold"/>
               </a:rPr>
-              <a:t>РЕГУЛЯРНЫЕ ПЛАТЕЖИ</a:t>
+              <a:t>КУРС ВАЛЮТ</a:t>
+            </a:r>
+            <a:endParaRPr lang="en-US" sz="7725" dirty="0">
+              <a:solidFill>
+                <a:srgbClr val="FFFFFF"/>
+              </a:solidFill>
+              <a:latin typeface="Big Shoulders Display Bold"/>
+            </a:endParaRPr>
+          </a:p>
+        </p:txBody>
+      </p:sp>
+      <p:sp>
+        <p:nvSpPr>
+          <p:cNvPr id="7" name="TextBox 7"/>
+          <p:cNvSpPr txBox="1"/>
+          <p:nvPr/>
+        </p:nvSpPr>
+        <p:spPr>
+          <a:xfrm>
+            <a:off x="3340406" y="8357531"/>
+            <a:ext cx="13568555" cy="1020446"/>
+          </a:xfrm>
+          <a:prstGeom prst="rect">
+            <a:avLst/>
+          </a:prstGeom>
+        </p:spPr>
+        <p:txBody>
+          <a:bodyPr lIns="0" tIns="0" rIns="0" bIns="0" rtlCol="0" anchor="t">
+            <a:spAutoFit/>
+          </a:bodyPr>
+          <a:lstStyle/>
+          <a:p>
+            <a:pPr>
+              <a:lnSpc>
+                <a:spcPts val="4159"/>
+              </a:lnSpc>
+            </a:pPr>
+            <a:r>
+              <a:rPr lang="en-US" sz="2599">
+                <a:solidFill>
+                  <a:srgbClr val="FFFFFF"/>
+                </a:solidFill>
+                <a:latin typeface="Lato"/>
+              </a:rPr>
+              <a:t>Курс валют к рублю предоставляется в виде своеобразной таблицы. Стоимость всех валют показывается на выбранную пользователем дату.</a:t>
             </a:r>
           </a:p>
         </p:txBody>
@@ -6562,6 +5662,13 @@
   <p:clrMapOvr>
     <a:masterClrMapping/>
   </p:clrMapOvr>
+  <p:timing>
+    <p:tnLst>
+      <p:par>
+        <p:cTn id="1" dur="indefinite" restart="never" nodeType="tmRoot"/>
+      </p:par>
+    </p:tnLst>
+  </p:timing>
 </p:sld>
 </file>
 

</xml_diff>